<commit_message>
update string processing 1  Please enter the commit message for your changes. Lines starting
</commit_message>
<xml_diff>
--- a/archive/presentations/FurtherDataTypesandFileProcessing.pptx
+++ b/archive/presentations/FurtherDataTypesandFileProcessing.pptx
@@ -25,6 +25,17 @@
     <p:sldId id="270" r:id="rId20"/>
     <p:sldId id="271" r:id="rId21"/>
     <p:sldId id="272" r:id="rId22"/>
+    <p:sldId id="273" r:id="rId23"/>
+    <p:sldId id="274" r:id="rId24"/>
+    <p:sldId id="275" r:id="rId25"/>
+    <p:sldId id="276" r:id="rId26"/>
+    <p:sldId id="277" r:id="rId27"/>
+    <p:sldId id="278" r:id="rId28"/>
+    <p:sldId id="279" r:id="rId29"/>
+    <p:sldId id="280" r:id="rId30"/>
+    <p:sldId id="281" r:id="rId31"/>
+    <p:sldId id="282" r:id="rId32"/>
+    <p:sldId id="283" r:id="rId33"/>
   </p:sldIdLst>
   <p:sldSz cy="5143500" cx="9144000"/>
   <p:notesSz cx="6858000" cy="9144000"/>
@@ -1593,6 +1604,204 @@
 </p:notes>
 </file>
 
+<file path=ppt/notesSlides/notesSlide18.xml><?xml version="1.0" encoding="utf-8"?>
+<p:notes xmlns:a="http://schemas.openxmlformats.org/drawingml/2006/main" xmlns:r="http://schemas.openxmlformats.org/officeDocument/2006/relationships" xmlns:mc="http://schemas.openxmlformats.org/markup-compatibility/2006" xmlns:mv="urn:schemas-microsoft-com:mac:vml" xmlns:p="http://schemas.openxmlformats.org/presentationml/2006/main" xmlns:c="http://schemas.openxmlformats.org/drawingml/2006/chart" xmlns:dgm="http://schemas.openxmlformats.org/drawingml/2006/diagram" xmlns:o="urn:schemas-microsoft-com:office:office" xmlns:v="urn:schemas-microsoft-com:vml" xmlns:pvml="urn:schemas-microsoft-com:office:powerpoint" xmlns:com="http://schemas.openxmlformats.org/drawingml/2006/compatibility" xmlns:p14="http://schemas.microsoft.com/office/powerpoint/2010/main" xmlns:p15="http://schemas.microsoft.com/office/powerpoint/2012/main" xmlns:ahyp="http://schemas.microsoft.com/office/drawing/2018/hyperlinkcolor" showMasterPhAnim="0" showMasterSp="0">
+  <p:cSld>
+    <p:spTree>
+      <p:nvGrpSpPr>
+        <p:cNvPr id="155" name="Shape 155"/>
+        <p:cNvGrpSpPr/>
+        <p:nvPr/>
+      </p:nvGrpSpPr>
+      <p:grpSpPr>
+        <a:xfrm>
+          <a:off x="0" y="0"/>
+          <a:ext cx="0" cy="0"/>
+          <a:chOff x="0" y="0"/>
+          <a:chExt cx="0" cy="0"/>
+        </a:xfrm>
+      </p:grpSpPr>
+      <p:sp>
+        <p:nvSpPr>
+          <p:cNvPr id="156" name="Google Shape;156;g14951e060c2_0_152:notes"/>
+          <p:cNvSpPr/>
+          <p:nvPr>
+            <p:ph idx="2" type="sldImg"/>
+          </p:nvPr>
+        </p:nvSpPr>
+        <p:spPr>
+          <a:xfrm>
+            <a:off x="381300" y="685800"/>
+            <a:ext cx="6096000" cy="3429000"/>
+          </a:xfrm>
+          <a:custGeom>
+            <a:rect b="b" l="l" r="r" t="t"/>
+            <a:pathLst>
+              <a:path extrusionOk="0" h="120000" w="120000">
+                <a:moveTo>
+                  <a:pt x="0" y="0"/>
+                </a:moveTo>
+                <a:lnTo>
+                  <a:pt x="120000" y="0"/>
+                </a:lnTo>
+                <a:lnTo>
+                  <a:pt x="120000" y="120000"/>
+                </a:lnTo>
+                <a:lnTo>
+                  <a:pt x="0" y="120000"/>
+                </a:lnTo>
+                <a:close/>
+              </a:path>
+            </a:pathLst>
+          </a:custGeom>
+        </p:spPr>
+      </p:sp>
+      <p:sp>
+        <p:nvSpPr>
+          <p:cNvPr id="157" name="Google Shape;157;g14951e060c2_0_152:notes"/>
+          <p:cNvSpPr txBox="1"/>
+          <p:nvPr>
+            <p:ph idx="1" type="body"/>
+          </p:nvPr>
+        </p:nvSpPr>
+        <p:spPr>
+          <a:xfrm>
+            <a:off x="685800" y="4343400"/>
+            <a:ext cx="5486400" cy="4114800"/>
+          </a:xfrm>
+          <a:prstGeom prst="rect">
+            <a:avLst/>
+          </a:prstGeom>
+        </p:spPr>
+        <p:txBody>
+          <a:bodyPr anchorCtr="0" anchor="t" bIns="91425" lIns="91425" spcFirstLastPara="1" rIns="91425" wrap="square" tIns="91425">
+            <a:noAutofit/>
+          </a:bodyPr>
+          <a:lstStyle/>
+          <a:p>
+            <a:pPr indent="0" lvl="0" marL="0" rtl="0" algn="l">
+              <a:spcBef>
+                <a:spcPts val="0"/>
+              </a:spcBef>
+              <a:spcAft>
+                <a:spcPts val="0"/>
+              </a:spcAft>
+              <a:buNone/>
+            </a:pPr>
+            <a:r>
+              <a:t/>
+            </a:r>
+            <a:endParaRPr/>
+          </a:p>
+        </p:txBody>
+      </p:sp>
+    </p:spTree>
+  </p:cSld>
+  <p:clrMapOvr>
+    <a:masterClrMapping/>
+  </p:clrMapOvr>
+</p:notes>
+</file>
+
+<file path=ppt/notesSlides/notesSlide19.xml><?xml version="1.0" encoding="utf-8"?>
+<p:notes xmlns:a="http://schemas.openxmlformats.org/drawingml/2006/main" xmlns:r="http://schemas.openxmlformats.org/officeDocument/2006/relationships" xmlns:mc="http://schemas.openxmlformats.org/markup-compatibility/2006" xmlns:mv="urn:schemas-microsoft-com:mac:vml" xmlns:p="http://schemas.openxmlformats.org/presentationml/2006/main" xmlns:c="http://schemas.openxmlformats.org/drawingml/2006/chart" xmlns:dgm="http://schemas.openxmlformats.org/drawingml/2006/diagram" xmlns:o="urn:schemas-microsoft-com:office:office" xmlns:v="urn:schemas-microsoft-com:vml" xmlns:pvml="urn:schemas-microsoft-com:office:powerpoint" xmlns:com="http://schemas.openxmlformats.org/drawingml/2006/compatibility" xmlns:p14="http://schemas.microsoft.com/office/powerpoint/2010/main" xmlns:p15="http://schemas.microsoft.com/office/powerpoint/2012/main" xmlns:ahyp="http://schemas.microsoft.com/office/drawing/2018/hyperlinkcolor" showMasterPhAnim="0" showMasterSp="0">
+  <p:cSld>
+    <p:spTree>
+      <p:nvGrpSpPr>
+        <p:cNvPr id="161" name="Shape 161"/>
+        <p:cNvGrpSpPr/>
+        <p:nvPr/>
+      </p:nvGrpSpPr>
+      <p:grpSpPr>
+        <a:xfrm>
+          <a:off x="0" y="0"/>
+          <a:ext cx="0" cy="0"/>
+          <a:chOff x="0" y="0"/>
+          <a:chExt cx="0" cy="0"/>
+        </a:xfrm>
+      </p:grpSpPr>
+      <p:sp>
+        <p:nvSpPr>
+          <p:cNvPr id="162" name="Google Shape;162;g14951e060c2_0_158:notes"/>
+          <p:cNvSpPr/>
+          <p:nvPr>
+            <p:ph idx="2" type="sldImg"/>
+          </p:nvPr>
+        </p:nvSpPr>
+        <p:spPr>
+          <a:xfrm>
+            <a:off x="381300" y="685800"/>
+            <a:ext cx="6096000" cy="3429000"/>
+          </a:xfrm>
+          <a:custGeom>
+            <a:rect b="b" l="l" r="r" t="t"/>
+            <a:pathLst>
+              <a:path extrusionOk="0" h="120000" w="120000">
+                <a:moveTo>
+                  <a:pt x="0" y="0"/>
+                </a:moveTo>
+                <a:lnTo>
+                  <a:pt x="120000" y="0"/>
+                </a:lnTo>
+                <a:lnTo>
+                  <a:pt x="120000" y="120000"/>
+                </a:lnTo>
+                <a:lnTo>
+                  <a:pt x="0" y="120000"/>
+                </a:lnTo>
+                <a:close/>
+              </a:path>
+            </a:pathLst>
+          </a:custGeom>
+        </p:spPr>
+      </p:sp>
+      <p:sp>
+        <p:nvSpPr>
+          <p:cNvPr id="163" name="Google Shape;163;g14951e060c2_0_158:notes"/>
+          <p:cNvSpPr txBox="1"/>
+          <p:nvPr>
+            <p:ph idx="1" type="body"/>
+          </p:nvPr>
+        </p:nvSpPr>
+        <p:spPr>
+          <a:xfrm>
+            <a:off x="685800" y="4343400"/>
+            <a:ext cx="5486400" cy="4114800"/>
+          </a:xfrm>
+          <a:prstGeom prst="rect">
+            <a:avLst/>
+          </a:prstGeom>
+        </p:spPr>
+        <p:txBody>
+          <a:bodyPr anchorCtr="0" anchor="t" bIns="91425" lIns="91425" spcFirstLastPara="1" rIns="91425" wrap="square" tIns="91425">
+            <a:noAutofit/>
+          </a:bodyPr>
+          <a:lstStyle/>
+          <a:p>
+            <a:pPr indent="0" lvl="0" marL="0" rtl="0" algn="l">
+              <a:spcBef>
+                <a:spcPts val="0"/>
+              </a:spcBef>
+              <a:spcAft>
+                <a:spcPts val="0"/>
+              </a:spcAft>
+              <a:buNone/>
+            </a:pPr>
+            <a:r>
+              <a:t/>
+            </a:r>
+            <a:endParaRPr/>
+          </a:p>
+        </p:txBody>
+      </p:sp>
+    </p:spTree>
+  </p:cSld>
+  <p:clrMapOvr>
+    <a:masterClrMapping/>
+  </p:clrMapOvr>
+</p:notes>
+</file>
+
 <file path=ppt/notesSlides/notesSlide2.xml><?xml version="1.0" encoding="utf-8"?>
 <p:notes xmlns:a="http://schemas.openxmlformats.org/drawingml/2006/main" xmlns:r="http://schemas.openxmlformats.org/officeDocument/2006/relationships" xmlns:mc="http://schemas.openxmlformats.org/markup-compatibility/2006" xmlns:mv="urn:schemas-microsoft-com:mac:vml" xmlns:p="http://schemas.openxmlformats.org/presentationml/2006/main" xmlns:c="http://schemas.openxmlformats.org/drawingml/2006/chart" xmlns:dgm="http://schemas.openxmlformats.org/drawingml/2006/diagram" xmlns:o="urn:schemas-microsoft-com:office:office" xmlns:v="urn:schemas-microsoft-com:vml" xmlns:pvml="urn:schemas-microsoft-com:office:powerpoint" xmlns:com="http://schemas.openxmlformats.org/drawingml/2006/compatibility" xmlns:p14="http://schemas.microsoft.com/office/powerpoint/2010/main" xmlns:p15="http://schemas.microsoft.com/office/powerpoint/2012/main" xmlns:ahyp="http://schemas.microsoft.com/office/drawing/2018/hyperlinkcolor" showMasterPhAnim="0" showMasterSp="0">
   <p:cSld>
@@ -1648,6 +1857,897 @@
       <p:sp>
         <p:nvSpPr>
           <p:cNvPr id="61" name="Google Shape;61;g14951e060c2_0_48:notes"/>
+          <p:cNvSpPr txBox="1"/>
+          <p:nvPr>
+            <p:ph idx="1" type="body"/>
+          </p:nvPr>
+        </p:nvSpPr>
+        <p:spPr>
+          <a:xfrm>
+            <a:off x="685800" y="4343400"/>
+            <a:ext cx="5486400" cy="4114800"/>
+          </a:xfrm>
+          <a:prstGeom prst="rect">
+            <a:avLst/>
+          </a:prstGeom>
+        </p:spPr>
+        <p:txBody>
+          <a:bodyPr anchorCtr="0" anchor="t" bIns="91425" lIns="91425" spcFirstLastPara="1" rIns="91425" wrap="square" tIns="91425">
+            <a:noAutofit/>
+          </a:bodyPr>
+          <a:lstStyle/>
+          <a:p>
+            <a:pPr indent="0" lvl="0" marL="0" rtl="0" algn="l">
+              <a:spcBef>
+                <a:spcPts val="0"/>
+              </a:spcBef>
+              <a:spcAft>
+                <a:spcPts val="0"/>
+              </a:spcAft>
+              <a:buNone/>
+            </a:pPr>
+            <a:r>
+              <a:t/>
+            </a:r>
+            <a:endParaRPr/>
+          </a:p>
+        </p:txBody>
+      </p:sp>
+    </p:spTree>
+  </p:cSld>
+  <p:clrMapOvr>
+    <a:masterClrMapping/>
+  </p:clrMapOvr>
+</p:notes>
+</file>
+
+<file path=ppt/notesSlides/notesSlide20.xml><?xml version="1.0" encoding="utf-8"?>
+<p:notes xmlns:a="http://schemas.openxmlformats.org/drawingml/2006/main" xmlns:r="http://schemas.openxmlformats.org/officeDocument/2006/relationships" xmlns:mc="http://schemas.openxmlformats.org/markup-compatibility/2006" xmlns:mv="urn:schemas-microsoft-com:mac:vml" xmlns:p="http://schemas.openxmlformats.org/presentationml/2006/main" xmlns:c="http://schemas.openxmlformats.org/drawingml/2006/chart" xmlns:dgm="http://schemas.openxmlformats.org/drawingml/2006/diagram" xmlns:o="urn:schemas-microsoft-com:office:office" xmlns:v="urn:schemas-microsoft-com:vml" xmlns:pvml="urn:schemas-microsoft-com:office:powerpoint" xmlns:com="http://schemas.openxmlformats.org/drawingml/2006/compatibility" xmlns:p14="http://schemas.microsoft.com/office/powerpoint/2010/main" xmlns:p15="http://schemas.microsoft.com/office/powerpoint/2012/main" xmlns:ahyp="http://schemas.microsoft.com/office/drawing/2018/hyperlinkcolor" showMasterPhAnim="0" showMasterSp="0">
+  <p:cSld>
+    <p:spTree>
+      <p:nvGrpSpPr>
+        <p:cNvPr id="167" name="Shape 167"/>
+        <p:cNvGrpSpPr/>
+        <p:nvPr/>
+      </p:nvGrpSpPr>
+      <p:grpSpPr>
+        <a:xfrm>
+          <a:off x="0" y="0"/>
+          <a:ext cx="0" cy="0"/>
+          <a:chOff x="0" y="0"/>
+          <a:chExt cx="0" cy="0"/>
+        </a:xfrm>
+      </p:grpSpPr>
+      <p:sp>
+        <p:nvSpPr>
+          <p:cNvPr id="168" name="Google Shape;168;g14951e060c2_0_164:notes"/>
+          <p:cNvSpPr/>
+          <p:nvPr>
+            <p:ph idx="2" type="sldImg"/>
+          </p:nvPr>
+        </p:nvSpPr>
+        <p:spPr>
+          <a:xfrm>
+            <a:off x="381300" y="685800"/>
+            <a:ext cx="6096000" cy="3429000"/>
+          </a:xfrm>
+          <a:custGeom>
+            <a:rect b="b" l="l" r="r" t="t"/>
+            <a:pathLst>
+              <a:path extrusionOk="0" h="120000" w="120000">
+                <a:moveTo>
+                  <a:pt x="0" y="0"/>
+                </a:moveTo>
+                <a:lnTo>
+                  <a:pt x="120000" y="0"/>
+                </a:lnTo>
+                <a:lnTo>
+                  <a:pt x="120000" y="120000"/>
+                </a:lnTo>
+                <a:lnTo>
+                  <a:pt x="0" y="120000"/>
+                </a:lnTo>
+                <a:close/>
+              </a:path>
+            </a:pathLst>
+          </a:custGeom>
+        </p:spPr>
+      </p:sp>
+      <p:sp>
+        <p:nvSpPr>
+          <p:cNvPr id="169" name="Google Shape;169;g14951e060c2_0_164:notes"/>
+          <p:cNvSpPr txBox="1"/>
+          <p:nvPr>
+            <p:ph idx="1" type="body"/>
+          </p:nvPr>
+        </p:nvSpPr>
+        <p:spPr>
+          <a:xfrm>
+            <a:off x="685800" y="4343400"/>
+            <a:ext cx="5486400" cy="4114800"/>
+          </a:xfrm>
+          <a:prstGeom prst="rect">
+            <a:avLst/>
+          </a:prstGeom>
+        </p:spPr>
+        <p:txBody>
+          <a:bodyPr anchorCtr="0" anchor="t" bIns="91425" lIns="91425" spcFirstLastPara="1" rIns="91425" wrap="square" tIns="91425">
+            <a:noAutofit/>
+          </a:bodyPr>
+          <a:lstStyle/>
+          <a:p>
+            <a:pPr indent="0" lvl="0" marL="0" rtl="0" algn="l">
+              <a:spcBef>
+                <a:spcPts val="0"/>
+              </a:spcBef>
+              <a:spcAft>
+                <a:spcPts val="0"/>
+              </a:spcAft>
+              <a:buNone/>
+            </a:pPr>
+            <a:r>
+              <a:t/>
+            </a:r>
+            <a:endParaRPr/>
+          </a:p>
+        </p:txBody>
+      </p:sp>
+    </p:spTree>
+  </p:cSld>
+  <p:clrMapOvr>
+    <a:masterClrMapping/>
+  </p:clrMapOvr>
+</p:notes>
+</file>
+
+<file path=ppt/notesSlides/notesSlide21.xml><?xml version="1.0" encoding="utf-8"?>
+<p:notes xmlns:a="http://schemas.openxmlformats.org/drawingml/2006/main" xmlns:r="http://schemas.openxmlformats.org/officeDocument/2006/relationships" xmlns:mc="http://schemas.openxmlformats.org/markup-compatibility/2006" xmlns:mv="urn:schemas-microsoft-com:mac:vml" xmlns:p="http://schemas.openxmlformats.org/presentationml/2006/main" xmlns:c="http://schemas.openxmlformats.org/drawingml/2006/chart" xmlns:dgm="http://schemas.openxmlformats.org/drawingml/2006/diagram" xmlns:o="urn:schemas-microsoft-com:office:office" xmlns:v="urn:schemas-microsoft-com:vml" xmlns:pvml="urn:schemas-microsoft-com:office:powerpoint" xmlns:com="http://schemas.openxmlformats.org/drawingml/2006/compatibility" xmlns:p14="http://schemas.microsoft.com/office/powerpoint/2010/main" xmlns:p15="http://schemas.microsoft.com/office/powerpoint/2012/main" xmlns:ahyp="http://schemas.microsoft.com/office/drawing/2018/hyperlinkcolor" showMasterPhAnim="0" showMasterSp="0">
+  <p:cSld>
+    <p:spTree>
+      <p:nvGrpSpPr>
+        <p:cNvPr id="173" name="Shape 173"/>
+        <p:cNvGrpSpPr/>
+        <p:nvPr/>
+      </p:nvGrpSpPr>
+      <p:grpSpPr>
+        <a:xfrm>
+          <a:off x="0" y="0"/>
+          <a:ext cx="0" cy="0"/>
+          <a:chOff x="0" y="0"/>
+          <a:chExt cx="0" cy="0"/>
+        </a:xfrm>
+      </p:grpSpPr>
+      <p:sp>
+        <p:nvSpPr>
+          <p:cNvPr id="174" name="Google Shape;174;g14951e060c2_0_170:notes"/>
+          <p:cNvSpPr/>
+          <p:nvPr>
+            <p:ph idx="2" type="sldImg"/>
+          </p:nvPr>
+        </p:nvSpPr>
+        <p:spPr>
+          <a:xfrm>
+            <a:off x="381300" y="685800"/>
+            <a:ext cx="6096000" cy="3429000"/>
+          </a:xfrm>
+          <a:custGeom>
+            <a:rect b="b" l="l" r="r" t="t"/>
+            <a:pathLst>
+              <a:path extrusionOk="0" h="120000" w="120000">
+                <a:moveTo>
+                  <a:pt x="0" y="0"/>
+                </a:moveTo>
+                <a:lnTo>
+                  <a:pt x="120000" y="0"/>
+                </a:lnTo>
+                <a:lnTo>
+                  <a:pt x="120000" y="120000"/>
+                </a:lnTo>
+                <a:lnTo>
+                  <a:pt x="0" y="120000"/>
+                </a:lnTo>
+                <a:close/>
+              </a:path>
+            </a:pathLst>
+          </a:custGeom>
+        </p:spPr>
+      </p:sp>
+      <p:sp>
+        <p:nvSpPr>
+          <p:cNvPr id="175" name="Google Shape;175;g14951e060c2_0_170:notes"/>
+          <p:cNvSpPr txBox="1"/>
+          <p:nvPr>
+            <p:ph idx="1" type="body"/>
+          </p:nvPr>
+        </p:nvSpPr>
+        <p:spPr>
+          <a:xfrm>
+            <a:off x="685800" y="4343400"/>
+            <a:ext cx="5486400" cy="4114800"/>
+          </a:xfrm>
+          <a:prstGeom prst="rect">
+            <a:avLst/>
+          </a:prstGeom>
+        </p:spPr>
+        <p:txBody>
+          <a:bodyPr anchorCtr="0" anchor="t" bIns="91425" lIns="91425" spcFirstLastPara="1" rIns="91425" wrap="square" tIns="91425">
+            <a:noAutofit/>
+          </a:bodyPr>
+          <a:lstStyle/>
+          <a:p>
+            <a:pPr indent="0" lvl="0" marL="0" rtl="0" algn="l">
+              <a:spcBef>
+                <a:spcPts val="0"/>
+              </a:spcBef>
+              <a:spcAft>
+                <a:spcPts val="0"/>
+              </a:spcAft>
+              <a:buNone/>
+            </a:pPr>
+            <a:r>
+              <a:t/>
+            </a:r>
+            <a:endParaRPr/>
+          </a:p>
+        </p:txBody>
+      </p:sp>
+    </p:spTree>
+  </p:cSld>
+  <p:clrMapOvr>
+    <a:masterClrMapping/>
+  </p:clrMapOvr>
+</p:notes>
+</file>
+
+<file path=ppt/notesSlides/notesSlide22.xml><?xml version="1.0" encoding="utf-8"?>
+<p:notes xmlns:a="http://schemas.openxmlformats.org/drawingml/2006/main" xmlns:r="http://schemas.openxmlformats.org/officeDocument/2006/relationships" xmlns:mc="http://schemas.openxmlformats.org/markup-compatibility/2006" xmlns:mv="urn:schemas-microsoft-com:mac:vml" xmlns:p="http://schemas.openxmlformats.org/presentationml/2006/main" xmlns:c="http://schemas.openxmlformats.org/drawingml/2006/chart" xmlns:dgm="http://schemas.openxmlformats.org/drawingml/2006/diagram" xmlns:o="urn:schemas-microsoft-com:office:office" xmlns:v="urn:schemas-microsoft-com:vml" xmlns:pvml="urn:schemas-microsoft-com:office:powerpoint" xmlns:com="http://schemas.openxmlformats.org/drawingml/2006/compatibility" xmlns:p14="http://schemas.microsoft.com/office/powerpoint/2010/main" xmlns:p15="http://schemas.microsoft.com/office/powerpoint/2012/main" xmlns:ahyp="http://schemas.microsoft.com/office/drawing/2018/hyperlinkcolor" showMasterPhAnim="0" showMasterSp="0">
+  <p:cSld>
+    <p:spTree>
+      <p:nvGrpSpPr>
+        <p:cNvPr id="179" name="Shape 179"/>
+        <p:cNvGrpSpPr/>
+        <p:nvPr/>
+      </p:nvGrpSpPr>
+      <p:grpSpPr>
+        <a:xfrm>
+          <a:off x="0" y="0"/>
+          <a:ext cx="0" cy="0"/>
+          <a:chOff x="0" y="0"/>
+          <a:chExt cx="0" cy="0"/>
+        </a:xfrm>
+      </p:grpSpPr>
+      <p:sp>
+        <p:nvSpPr>
+          <p:cNvPr id="180" name="Google Shape;180;g14951e060c2_0_176:notes"/>
+          <p:cNvSpPr/>
+          <p:nvPr>
+            <p:ph idx="2" type="sldImg"/>
+          </p:nvPr>
+        </p:nvSpPr>
+        <p:spPr>
+          <a:xfrm>
+            <a:off x="381300" y="685800"/>
+            <a:ext cx="6096000" cy="3429000"/>
+          </a:xfrm>
+          <a:custGeom>
+            <a:rect b="b" l="l" r="r" t="t"/>
+            <a:pathLst>
+              <a:path extrusionOk="0" h="120000" w="120000">
+                <a:moveTo>
+                  <a:pt x="0" y="0"/>
+                </a:moveTo>
+                <a:lnTo>
+                  <a:pt x="120000" y="0"/>
+                </a:lnTo>
+                <a:lnTo>
+                  <a:pt x="120000" y="120000"/>
+                </a:lnTo>
+                <a:lnTo>
+                  <a:pt x="0" y="120000"/>
+                </a:lnTo>
+                <a:close/>
+              </a:path>
+            </a:pathLst>
+          </a:custGeom>
+        </p:spPr>
+      </p:sp>
+      <p:sp>
+        <p:nvSpPr>
+          <p:cNvPr id="181" name="Google Shape;181;g14951e060c2_0_176:notes"/>
+          <p:cNvSpPr txBox="1"/>
+          <p:nvPr>
+            <p:ph idx="1" type="body"/>
+          </p:nvPr>
+        </p:nvSpPr>
+        <p:spPr>
+          <a:xfrm>
+            <a:off x="685800" y="4343400"/>
+            <a:ext cx="5486400" cy="4114800"/>
+          </a:xfrm>
+          <a:prstGeom prst="rect">
+            <a:avLst/>
+          </a:prstGeom>
+        </p:spPr>
+        <p:txBody>
+          <a:bodyPr anchorCtr="0" anchor="t" bIns="91425" lIns="91425" spcFirstLastPara="1" rIns="91425" wrap="square" tIns="91425">
+            <a:noAutofit/>
+          </a:bodyPr>
+          <a:lstStyle/>
+          <a:p>
+            <a:pPr indent="0" lvl="0" marL="0" rtl="0" algn="l">
+              <a:spcBef>
+                <a:spcPts val="0"/>
+              </a:spcBef>
+              <a:spcAft>
+                <a:spcPts val="0"/>
+              </a:spcAft>
+              <a:buNone/>
+            </a:pPr>
+            <a:r>
+              <a:t/>
+            </a:r>
+            <a:endParaRPr/>
+          </a:p>
+        </p:txBody>
+      </p:sp>
+    </p:spTree>
+  </p:cSld>
+  <p:clrMapOvr>
+    <a:masterClrMapping/>
+  </p:clrMapOvr>
+</p:notes>
+</file>
+
+<file path=ppt/notesSlides/notesSlide23.xml><?xml version="1.0" encoding="utf-8"?>
+<p:notes xmlns:a="http://schemas.openxmlformats.org/drawingml/2006/main" xmlns:r="http://schemas.openxmlformats.org/officeDocument/2006/relationships" xmlns:mc="http://schemas.openxmlformats.org/markup-compatibility/2006" xmlns:mv="urn:schemas-microsoft-com:mac:vml" xmlns:p="http://schemas.openxmlformats.org/presentationml/2006/main" xmlns:c="http://schemas.openxmlformats.org/drawingml/2006/chart" xmlns:dgm="http://schemas.openxmlformats.org/drawingml/2006/diagram" xmlns:o="urn:schemas-microsoft-com:office:office" xmlns:v="urn:schemas-microsoft-com:vml" xmlns:pvml="urn:schemas-microsoft-com:office:powerpoint" xmlns:com="http://schemas.openxmlformats.org/drawingml/2006/compatibility" xmlns:p14="http://schemas.microsoft.com/office/powerpoint/2010/main" xmlns:p15="http://schemas.microsoft.com/office/powerpoint/2012/main" xmlns:ahyp="http://schemas.microsoft.com/office/drawing/2018/hyperlinkcolor" showMasterPhAnim="0" showMasterSp="0">
+  <p:cSld>
+    <p:spTree>
+      <p:nvGrpSpPr>
+        <p:cNvPr id="185" name="Shape 185"/>
+        <p:cNvGrpSpPr/>
+        <p:nvPr/>
+      </p:nvGrpSpPr>
+      <p:grpSpPr>
+        <a:xfrm>
+          <a:off x="0" y="0"/>
+          <a:ext cx="0" cy="0"/>
+          <a:chOff x="0" y="0"/>
+          <a:chExt cx="0" cy="0"/>
+        </a:xfrm>
+      </p:grpSpPr>
+      <p:sp>
+        <p:nvSpPr>
+          <p:cNvPr id="186" name="Google Shape;186;g14951e060c2_0_146:notes"/>
+          <p:cNvSpPr/>
+          <p:nvPr>
+            <p:ph idx="2" type="sldImg"/>
+          </p:nvPr>
+        </p:nvSpPr>
+        <p:spPr>
+          <a:xfrm>
+            <a:off x="381300" y="685800"/>
+            <a:ext cx="6096000" cy="3429000"/>
+          </a:xfrm>
+          <a:custGeom>
+            <a:rect b="b" l="l" r="r" t="t"/>
+            <a:pathLst>
+              <a:path extrusionOk="0" h="120000" w="120000">
+                <a:moveTo>
+                  <a:pt x="0" y="0"/>
+                </a:moveTo>
+                <a:lnTo>
+                  <a:pt x="120000" y="0"/>
+                </a:lnTo>
+                <a:lnTo>
+                  <a:pt x="120000" y="120000"/>
+                </a:lnTo>
+                <a:lnTo>
+                  <a:pt x="0" y="120000"/>
+                </a:lnTo>
+                <a:close/>
+              </a:path>
+            </a:pathLst>
+          </a:custGeom>
+        </p:spPr>
+      </p:sp>
+      <p:sp>
+        <p:nvSpPr>
+          <p:cNvPr id="187" name="Google Shape;187;g14951e060c2_0_146:notes"/>
+          <p:cNvSpPr txBox="1"/>
+          <p:nvPr>
+            <p:ph idx="1" type="body"/>
+          </p:nvPr>
+        </p:nvSpPr>
+        <p:spPr>
+          <a:xfrm>
+            <a:off x="685800" y="4343400"/>
+            <a:ext cx="5486400" cy="4114800"/>
+          </a:xfrm>
+          <a:prstGeom prst="rect">
+            <a:avLst/>
+          </a:prstGeom>
+        </p:spPr>
+        <p:txBody>
+          <a:bodyPr anchorCtr="0" anchor="t" bIns="91425" lIns="91425" spcFirstLastPara="1" rIns="91425" wrap="square" tIns="91425">
+            <a:noAutofit/>
+          </a:bodyPr>
+          <a:lstStyle/>
+          <a:p>
+            <a:pPr indent="0" lvl="0" marL="0" rtl="0" algn="l">
+              <a:spcBef>
+                <a:spcPts val="0"/>
+              </a:spcBef>
+              <a:spcAft>
+                <a:spcPts val="0"/>
+              </a:spcAft>
+              <a:buNone/>
+            </a:pPr>
+            <a:r>
+              <a:t/>
+            </a:r>
+            <a:endParaRPr/>
+          </a:p>
+        </p:txBody>
+      </p:sp>
+    </p:spTree>
+  </p:cSld>
+  <p:clrMapOvr>
+    <a:masterClrMapping/>
+  </p:clrMapOvr>
+</p:notes>
+</file>
+
+<file path=ppt/notesSlides/notesSlide24.xml><?xml version="1.0" encoding="utf-8"?>
+<p:notes xmlns:a="http://schemas.openxmlformats.org/drawingml/2006/main" xmlns:r="http://schemas.openxmlformats.org/officeDocument/2006/relationships" xmlns:mc="http://schemas.openxmlformats.org/markup-compatibility/2006" xmlns:mv="urn:schemas-microsoft-com:mac:vml" xmlns:p="http://schemas.openxmlformats.org/presentationml/2006/main" xmlns:c="http://schemas.openxmlformats.org/drawingml/2006/chart" xmlns:dgm="http://schemas.openxmlformats.org/drawingml/2006/diagram" xmlns:o="urn:schemas-microsoft-com:office:office" xmlns:v="urn:schemas-microsoft-com:vml" xmlns:pvml="urn:schemas-microsoft-com:office:powerpoint" xmlns:com="http://schemas.openxmlformats.org/drawingml/2006/compatibility" xmlns:p14="http://schemas.microsoft.com/office/powerpoint/2010/main" xmlns:p15="http://schemas.microsoft.com/office/powerpoint/2012/main" xmlns:ahyp="http://schemas.microsoft.com/office/drawing/2018/hyperlinkcolor" showMasterPhAnim="0" showMasterSp="0">
+  <p:cSld>
+    <p:spTree>
+      <p:nvGrpSpPr>
+        <p:cNvPr id="191" name="Shape 191"/>
+        <p:cNvGrpSpPr/>
+        <p:nvPr/>
+      </p:nvGrpSpPr>
+      <p:grpSpPr>
+        <a:xfrm>
+          <a:off x="0" y="0"/>
+          <a:ext cx="0" cy="0"/>
+          <a:chOff x="0" y="0"/>
+          <a:chExt cx="0" cy="0"/>
+        </a:xfrm>
+      </p:grpSpPr>
+      <p:sp>
+        <p:nvSpPr>
+          <p:cNvPr id="192" name="Google Shape;192;g14951e060c2_0_193:notes"/>
+          <p:cNvSpPr/>
+          <p:nvPr>
+            <p:ph idx="2" type="sldImg"/>
+          </p:nvPr>
+        </p:nvSpPr>
+        <p:spPr>
+          <a:xfrm>
+            <a:off x="381300" y="685800"/>
+            <a:ext cx="6096000" cy="3429000"/>
+          </a:xfrm>
+          <a:custGeom>
+            <a:rect b="b" l="l" r="r" t="t"/>
+            <a:pathLst>
+              <a:path extrusionOk="0" h="120000" w="120000">
+                <a:moveTo>
+                  <a:pt x="0" y="0"/>
+                </a:moveTo>
+                <a:lnTo>
+                  <a:pt x="120000" y="0"/>
+                </a:lnTo>
+                <a:lnTo>
+                  <a:pt x="120000" y="120000"/>
+                </a:lnTo>
+                <a:lnTo>
+                  <a:pt x="0" y="120000"/>
+                </a:lnTo>
+                <a:close/>
+              </a:path>
+            </a:pathLst>
+          </a:custGeom>
+        </p:spPr>
+      </p:sp>
+      <p:sp>
+        <p:nvSpPr>
+          <p:cNvPr id="193" name="Google Shape;193;g14951e060c2_0_193:notes"/>
+          <p:cNvSpPr txBox="1"/>
+          <p:nvPr>
+            <p:ph idx="1" type="body"/>
+          </p:nvPr>
+        </p:nvSpPr>
+        <p:spPr>
+          <a:xfrm>
+            <a:off x="685800" y="4343400"/>
+            <a:ext cx="5486400" cy="4114800"/>
+          </a:xfrm>
+          <a:prstGeom prst="rect">
+            <a:avLst/>
+          </a:prstGeom>
+        </p:spPr>
+        <p:txBody>
+          <a:bodyPr anchorCtr="0" anchor="t" bIns="91425" lIns="91425" spcFirstLastPara="1" rIns="91425" wrap="square" tIns="91425">
+            <a:noAutofit/>
+          </a:bodyPr>
+          <a:lstStyle/>
+          <a:p>
+            <a:pPr indent="0" lvl="0" marL="0" rtl="0" algn="l">
+              <a:spcBef>
+                <a:spcPts val="0"/>
+              </a:spcBef>
+              <a:spcAft>
+                <a:spcPts val="0"/>
+              </a:spcAft>
+              <a:buNone/>
+            </a:pPr>
+            <a:r>
+              <a:t/>
+            </a:r>
+            <a:endParaRPr/>
+          </a:p>
+        </p:txBody>
+      </p:sp>
+    </p:spTree>
+  </p:cSld>
+  <p:clrMapOvr>
+    <a:masterClrMapping/>
+  </p:clrMapOvr>
+</p:notes>
+</file>
+
+<file path=ppt/notesSlides/notesSlide25.xml><?xml version="1.0" encoding="utf-8"?>
+<p:notes xmlns:a="http://schemas.openxmlformats.org/drawingml/2006/main" xmlns:r="http://schemas.openxmlformats.org/officeDocument/2006/relationships" xmlns:mc="http://schemas.openxmlformats.org/markup-compatibility/2006" xmlns:mv="urn:schemas-microsoft-com:mac:vml" xmlns:p="http://schemas.openxmlformats.org/presentationml/2006/main" xmlns:c="http://schemas.openxmlformats.org/drawingml/2006/chart" xmlns:dgm="http://schemas.openxmlformats.org/drawingml/2006/diagram" xmlns:o="urn:schemas-microsoft-com:office:office" xmlns:v="urn:schemas-microsoft-com:vml" xmlns:pvml="urn:schemas-microsoft-com:office:powerpoint" xmlns:com="http://schemas.openxmlformats.org/drawingml/2006/compatibility" xmlns:p14="http://schemas.microsoft.com/office/powerpoint/2010/main" xmlns:p15="http://schemas.microsoft.com/office/powerpoint/2012/main" xmlns:ahyp="http://schemas.microsoft.com/office/drawing/2018/hyperlinkcolor" showMasterPhAnim="0" showMasterSp="0">
+  <p:cSld>
+    <p:spTree>
+      <p:nvGrpSpPr>
+        <p:cNvPr id="197" name="Shape 197"/>
+        <p:cNvGrpSpPr/>
+        <p:nvPr/>
+      </p:nvGrpSpPr>
+      <p:grpSpPr>
+        <a:xfrm>
+          <a:off x="0" y="0"/>
+          <a:ext cx="0" cy="0"/>
+          <a:chOff x="0" y="0"/>
+          <a:chExt cx="0" cy="0"/>
+        </a:xfrm>
+      </p:grpSpPr>
+      <p:sp>
+        <p:nvSpPr>
+          <p:cNvPr id="198" name="Google Shape;198;g14951e060c2_0_181:notes"/>
+          <p:cNvSpPr/>
+          <p:nvPr>
+            <p:ph idx="2" type="sldImg"/>
+          </p:nvPr>
+        </p:nvSpPr>
+        <p:spPr>
+          <a:xfrm>
+            <a:off x="381300" y="685800"/>
+            <a:ext cx="6096000" cy="3429000"/>
+          </a:xfrm>
+          <a:custGeom>
+            <a:rect b="b" l="l" r="r" t="t"/>
+            <a:pathLst>
+              <a:path extrusionOk="0" h="120000" w="120000">
+                <a:moveTo>
+                  <a:pt x="0" y="0"/>
+                </a:moveTo>
+                <a:lnTo>
+                  <a:pt x="120000" y="0"/>
+                </a:lnTo>
+                <a:lnTo>
+                  <a:pt x="120000" y="120000"/>
+                </a:lnTo>
+                <a:lnTo>
+                  <a:pt x="0" y="120000"/>
+                </a:lnTo>
+                <a:close/>
+              </a:path>
+            </a:pathLst>
+          </a:custGeom>
+        </p:spPr>
+      </p:sp>
+      <p:sp>
+        <p:nvSpPr>
+          <p:cNvPr id="199" name="Google Shape;199;g14951e060c2_0_181:notes"/>
+          <p:cNvSpPr txBox="1"/>
+          <p:nvPr>
+            <p:ph idx="1" type="body"/>
+          </p:nvPr>
+        </p:nvSpPr>
+        <p:spPr>
+          <a:xfrm>
+            <a:off x="685800" y="4343400"/>
+            <a:ext cx="5486400" cy="4114800"/>
+          </a:xfrm>
+          <a:prstGeom prst="rect">
+            <a:avLst/>
+          </a:prstGeom>
+        </p:spPr>
+        <p:txBody>
+          <a:bodyPr anchorCtr="0" anchor="t" bIns="91425" lIns="91425" spcFirstLastPara="1" rIns="91425" wrap="square" tIns="91425">
+            <a:noAutofit/>
+          </a:bodyPr>
+          <a:lstStyle/>
+          <a:p>
+            <a:pPr indent="0" lvl="0" marL="0" rtl="0" algn="l">
+              <a:spcBef>
+                <a:spcPts val="0"/>
+              </a:spcBef>
+              <a:spcAft>
+                <a:spcPts val="0"/>
+              </a:spcAft>
+              <a:buNone/>
+            </a:pPr>
+            <a:r>
+              <a:t/>
+            </a:r>
+            <a:endParaRPr/>
+          </a:p>
+        </p:txBody>
+      </p:sp>
+    </p:spTree>
+  </p:cSld>
+  <p:clrMapOvr>
+    <a:masterClrMapping/>
+  </p:clrMapOvr>
+</p:notes>
+</file>
+
+<file path=ppt/notesSlides/notesSlide26.xml><?xml version="1.0" encoding="utf-8"?>
+<p:notes xmlns:a="http://schemas.openxmlformats.org/drawingml/2006/main" xmlns:r="http://schemas.openxmlformats.org/officeDocument/2006/relationships" xmlns:mc="http://schemas.openxmlformats.org/markup-compatibility/2006" xmlns:mv="urn:schemas-microsoft-com:mac:vml" xmlns:p="http://schemas.openxmlformats.org/presentationml/2006/main" xmlns:c="http://schemas.openxmlformats.org/drawingml/2006/chart" xmlns:dgm="http://schemas.openxmlformats.org/drawingml/2006/diagram" xmlns:o="urn:schemas-microsoft-com:office:office" xmlns:v="urn:schemas-microsoft-com:vml" xmlns:pvml="urn:schemas-microsoft-com:office:powerpoint" xmlns:com="http://schemas.openxmlformats.org/drawingml/2006/compatibility" xmlns:p14="http://schemas.microsoft.com/office/powerpoint/2010/main" xmlns:p15="http://schemas.microsoft.com/office/powerpoint/2012/main" xmlns:ahyp="http://schemas.microsoft.com/office/drawing/2018/hyperlinkcolor" showMasterPhAnim="0" showMasterSp="0">
+  <p:cSld>
+    <p:spTree>
+      <p:nvGrpSpPr>
+        <p:cNvPr id="203" name="Shape 203"/>
+        <p:cNvGrpSpPr/>
+        <p:nvPr/>
+      </p:nvGrpSpPr>
+      <p:grpSpPr>
+        <a:xfrm>
+          <a:off x="0" y="0"/>
+          <a:ext cx="0" cy="0"/>
+          <a:chOff x="0" y="0"/>
+          <a:chExt cx="0" cy="0"/>
+        </a:xfrm>
+      </p:grpSpPr>
+      <p:sp>
+        <p:nvSpPr>
+          <p:cNvPr id="204" name="Google Shape;204;g14951e060c2_0_188:notes"/>
+          <p:cNvSpPr/>
+          <p:nvPr>
+            <p:ph idx="2" type="sldImg"/>
+          </p:nvPr>
+        </p:nvSpPr>
+        <p:spPr>
+          <a:xfrm>
+            <a:off x="381300" y="685800"/>
+            <a:ext cx="6096000" cy="3429000"/>
+          </a:xfrm>
+          <a:custGeom>
+            <a:rect b="b" l="l" r="r" t="t"/>
+            <a:pathLst>
+              <a:path extrusionOk="0" h="120000" w="120000">
+                <a:moveTo>
+                  <a:pt x="0" y="0"/>
+                </a:moveTo>
+                <a:lnTo>
+                  <a:pt x="120000" y="0"/>
+                </a:lnTo>
+                <a:lnTo>
+                  <a:pt x="120000" y="120000"/>
+                </a:lnTo>
+                <a:lnTo>
+                  <a:pt x="0" y="120000"/>
+                </a:lnTo>
+                <a:close/>
+              </a:path>
+            </a:pathLst>
+          </a:custGeom>
+        </p:spPr>
+      </p:sp>
+      <p:sp>
+        <p:nvSpPr>
+          <p:cNvPr id="205" name="Google Shape;205;g14951e060c2_0_188:notes"/>
+          <p:cNvSpPr txBox="1"/>
+          <p:nvPr>
+            <p:ph idx="1" type="body"/>
+          </p:nvPr>
+        </p:nvSpPr>
+        <p:spPr>
+          <a:xfrm>
+            <a:off x="685800" y="4343400"/>
+            <a:ext cx="5486400" cy="4114800"/>
+          </a:xfrm>
+          <a:prstGeom prst="rect">
+            <a:avLst/>
+          </a:prstGeom>
+        </p:spPr>
+        <p:txBody>
+          <a:bodyPr anchorCtr="0" anchor="t" bIns="91425" lIns="91425" spcFirstLastPara="1" rIns="91425" wrap="square" tIns="91425">
+            <a:noAutofit/>
+          </a:bodyPr>
+          <a:lstStyle/>
+          <a:p>
+            <a:pPr indent="0" lvl="0" marL="0" rtl="0" algn="l">
+              <a:spcBef>
+                <a:spcPts val="0"/>
+              </a:spcBef>
+              <a:spcAft>
+                <a:spcPts val="0"/>
+              </a:spcAft>
+              <a:buNone/>
+            </a:pPr>
+            <a:r>
+              <a:t/>
+            </a:r>
+            <a:endParaRPr/>
+          </a:p>
+        </p:txBody>
+      </p:sp>
+    </p:spTree>
+  </p:cSld>
+  <p:clrMapOvr>
+    <a:masterClrMapping/>
+  </p:clrMapOvr>
+</p:notes>
+</file>
+
+<file path=ppt/notesSlides/notesSlide27.xml><?xml version="1.0" encoding="utf-8"?>
+<p:notes xmlns:a="http://schemas.openxmlformats.org/drawingml/2006/main" xmlns:r="http://schemas.openxmlformats.org/officeDocument/2006/relationships" xmlns:mc="http://schemas.openxmlformats.org/markup-compatibility/2006" xmlns:mv="urn:schemas-microsoft-com:mac:vml" xmlns:p="http://schemas.openxmlformats.org/presentationml/2006/main" xmlns:c="http://schemas.openxmlformats.org/drawingml/2006/chart" xmlns:dgm="http://schemas.openxmlformats.org/drawingml/2006/diagram" xmlns:o="urn:schemas-microsoft-com:office:office" xmlns:v="urn:schemas-microsoft-com:vml" xmlns:pvml="urn:schemas-microsoft-com:office:powerpoint" xmlns:com="http://schemas.openxmlformats.org/drawingml/2006/compatibility" xmlns:p14="http://schemas.microsoft.com/office/powerpoint/2010/main" xmlns:p15="http://schemas.microsoft.com/office/powerpoint/2012/main" xmlns:ahyp="http://schemas.microsoft.com/office/drawing/2018/hyperlinkcolor" showMasterPhAnim="0" showMasterSp="0">
+  <p:cSld>
+    <p:spTree>
+      <p:nvGrpSpPr>
+        <p:cNvPr id="209" name="Shape 209"/>
+        <p:cNvGrpSpPr/>
+        <p:nvPr/>
+      </p:nvGrpSpPr>
+      <p:grpSpPr>
+        <a:xfrm>
+          <a:off x="0" y="0"/>
+          <a:ext cx="0" cy="0"/>
+          <a:chOff x="0" y="0"/>
+          <a:chExt cx="0" cy="0"/>
+        </a:xfrm>
+      </p:grpSpPr>
+      <p:sp>
+        <p:nvSpPr>
+          <p:cNvPr id="210" name="Google Shape;210;g14951e060c2_0_199:notes"/>
+          <p:cNvSpPr/>
+          <p:nvPr>
+            <p:ph idx="2" type="sldImg"/>
+          </p:nvPr>
+        </p:nvSpPr>
+        <p:spPr>
+          <a:xfrm>
+            <a:off x="381300" y="685800"/>
+            <a:ext cx="6096000" cy="3429000"/>
+          </a:xfrm>
+          <a:custGeom>
+            <a:rect b="b" l="l" r="r" t="t"/>
+            <a:pathLst>
+              <a:path extrusionOk="0" h="120000" w="120000">
+                <a:moveTo>
+                  <a:pt x="0" y="0"/>
+                </a:moveTo>
+                <a:lnTo>
+                  <a:pt x="120000" y="0"/>
+                </a:lnTo>
+                <a:lnTo>
+                  <a:pt x="120000" y="120000"/>
+                </a:lnTo>
+                <a:lnTo>
+                  <a:pt x="0" y="120000"/>
+                </a:lnTo>
+                <a:close/>
+              </a:path>
+            </a:pathLst>
+          </a:custGeom>
+        </p:spPr>
+      </p:sp>
+      <p:sp>
+        <p:nvSpPr>
+          <p:cNvPr id="211" name="Google Shape;211;g14951e060c2_0_199:notes"/>
+          <p:cNvSpPr txBox="1"/>
+          <p:nvPr>
+            <p:ph idx="1" type="body"/>
+          </p:nvPr>
+        </p:nvSpPr>
+        <p:spPr>
+          <a:xfrm>
+            <a:off x="685800" y="4343400"/>
+            <a:ext cx="5486400" cy="4114800"/>
+          </a:xfrm>
+          <a:prstGeom prst="rect">
+            <a:avLst/>
+          </a:prstGeom>
+        </p:spPr>
+        <p:txBody>
+          <a:bodyPr anchorCtr="0" anchor="t" bIns="91425" lIns="91425" spcFirstLastPara="1" rIns="91425" wrap="square" tIns="91425">
+            <a:noAutofit/>
+          </a:bodyPr>
+          <a:lstStyle/>
+          <a:p>
+            <a:pPr indent="0" lvl="0" marL="0" rtl="0" algn="l">
+              <a:spcBef>
+                <a:spcPts val="0"/>
+              </a:spcBef>
+              <a:spcAft>
+                <a:spcPts val="0"/>
+              </a:spcAft>
+              <a:buNone/>
+            </a:pPr>
+            <a:r>
+              <a:t/>
+            </a:r>
+            <a:endParaRPr/>
+          </a:p>
+        </p:txBody>
+      </p:sp>
+    </p:spTree>
+  </p:cSld>
+  <p:clrMapOvr>
+    <a:masterClrMapping/>
+  </p:clrMapOvr>
+</p:notes>
+</file>
+
+<file path=ppt/notesSlides/notesSlide28.xml><?xml version="1.0" encoding="utf-8"?>
+<p:notes xmlns:a="http://schemas.openxmlformats.org/drawingml/2006/main" xmlns:r="http://schemas.openxmlformats.org/officeDocument/2006/relationships" xmlns:mc="http://schemas.openxmlformats.org/markup-compatibility/2006" xmlns:mv="urn:schemas-microsoft-com:mac:vml" xmlns:p="http://schemas.openxmlformats.org/presentationml/2006/main" xmlns:c="http://schemas.openxmlformats.org/drawingml/2006/chart" xmlns:dgm="http://schemas.openxmlformats.org/drawingml/2006/diagram" xmlns:o="urn:schemas-microsoft-com:office:office" xmlns:v="urn:schemas-microsoft-com:vml" xmlns:pvml="urn:schemas-microsoft-com:office:powerpoint" xmlns:com="http://schemas.openxmlformats.org/drawingml/2006/compatibility" xmlns:p14="http://schemas.microsoft.com/office/powerpoint/2010/main" xmlns:p15="http://schemas.microsoft.com/office/powerpoint/2012/main" xmlns:ahyp="http://schemas.microsoft.com/office/drawing/2018/hyperlinkcolor" showMasterPhAnim="0" showMasterSp="0">
+  <p:cSld>
+    <p:spTree>
+      <p:nvGrpSpPr>
+        <p:cNvPr id="215" name="Shape 215"/>
+        <p:cNvGrpSpPr/>
+        <p:nvPr/>
+      </p:nvGrpSpPr>
+      <p:grpSpPr>
+        <a:xfrm>
+          <a:off x="0" y="0"/>
+          <a:ext cx="0" cy="0"/>
+          <a:chOff x="0" y="0"/>
+          <a:chExt cx="0" cy="0"/>
+        </a:xfrm>
+      </p:grpSpPr>
+      <p:sp>
+        <p:nvSpPr>
+          <p:cNvPr id="216" name="Google Shape;216;g14951e060c2_0_204:notes"/>
+          <p:cNvSpPr/>
+          <p:nvPr>
+            <p:ph idx="2" type="sldImg"/>
+          </p:nvPr>
+        </p:nvSpPr>
+        <p:spPr>
+          <a:xfrm>
+            <a:off x="381300" y="685800"/>
+            <a:ext cx="6096000" cy="3429000"/>
+          </a:xfrm>
+          <a:custGeom>
+            <a:rect b="b" l="l" r="r" t="t"/>
+            <a:pathLst>
+              <a:path extrusionOk="0" h="120000" w="120000">
+                <a:moveTo>
+                  <a:pt x="0" y="0"/>
+                </a:moveTo>
+                <a:lnTo>
+                  <a:pt x="120000" y="0"/>
+                </a:lnTo>
+                <a:lnTo>
+                  <a:pt x="120000" y="120000"/>
+                </a:lnTo>
+                <a:lnTo>
+                  <a:pt x="0" y="120000"/>
+                </a:lnTo>
+                <a:close/>
+              </a:path>
+            </a:pathLst>
+          </a:custGeom>
+        </p:spPr>
+      </p:sp>
+      <p:sp>
+        <p:nvSpPr>
+          <p:cNvPr id="217" name="Google Shape;217;g14951e060c2_0_204:notes"/>
           <p:cNvSpPr txBox="1"/>
           <p:nvPr>
             <p:ph idx="1" type="body"/>
@@ -10971,6 +12071,612 @@
 </p:sld>
 </file>
 
+<file path=ppt/slides/slide18.xml><?xml version="1.0" encoding="utf-8"?>
+<p:sld xmlns:a="http://schemas.openxmlformats.org/drawingml/2006/main" xmlns:r="http://schemas.openxmlformats.org/officeDocument/2006/relationships" xmlns:mc="http://schemas.openxmlformats.org/markup-compatibility/2006" xmlns:mv="urn:schemas-microsoft-com:mac:vml" xmlns:p="http://schemas.openxmlformats.org/presentationml/2006/main" xmlns:c="http://schemas.openxmlformats.org/drawingml/2006/chart" xmlns:dgm="http://schemas.openxmlformats.org/drawingml/2006/diagram" xmlns:o="urn:schemas-microsoft-com:office:office" xmlns:v="urn:schemas-microsoft-com:vml" xmlns:pvml="urn:schemas-microsoft-com:office:powerpoint" xmlns:com="http://schemas.openxmlformats.org/drawingml/2006/compatibility" xmlns:p14="http://schemas.microsoft.com/office/powerpoint/2010/main" xmlns:p15="http://schemas.microsoft.com/office/powerpoint/2012/main" xmlns:ahyp="http://schemas.microsoft.com/office/drawing/2018/hyperlinkcolor">
+  <p:cSld>
+    <p:spTree>
+      <p:nvGrpSpPr>
+        <p:cNvPr id="158" name="Shape 158"/>
+        <p:cNvGrpSpPr/>
+        <p:nvPr/>
+      </p:nvGrpSpPr>
+      <p:grpSpPr>
+        <a:xfrm>
+          <a:off x="0" y="0"/>
+          <a:ext cx="0" cy="0"/>
+          <a:chOff x="0" y="0"/>
+          <a:chExt cx="0" cy="0"/>
+        </a:xfrm>
+      </p:grpSpPr>
+      <p:sp>
+        <p:nvSpPr>
+          <p:cNvPr id="159" name="Google Shape;159;p31"/>
+          <p:cNvSpPr txBox="1"/>
+          <p:nvPr>
+            <p:ph type="title"/>
+          </p:nvPr>
+        </p:nvSpPr>
+        <p:spPr>
+          <a:xfrm>
+            <a:off x="2038925" y="213375"/>
+            <a:ext cx="8229600" cy="571500"/>
+          </a:xfrm>
+          <a:prstGeom prst="rect">
+            <a:avLst/>
+          </a:prstGeom>
+        </p:spPr>
+        <p:txBody>
+          <a:bodyPr anchorCtr="0" anchor="t" bIns="45700" lIns="91425" spcFirstLastPara="1" rIns="91425" wrap="square" tIns="45700">
+            <a:noAutofit/>
+          </a:bodyPr>
+          <a:lstStyle/>
+          <a:p>
+            <a:pPr indent="0" lvl="0" marL="0" rtl="0" algn="l">
+              <a:spcBef>
+                <a:spcPts val="0"/>
+              </a:spcBef>
+              <a:spcAft>
+                <a:spcPts val="0"/>
+              </a:spcAft>
+              <a:buNone/>
+            </a:pPr>
+            <a:r>
+              <a:rPr lang="en-GB"/>
+              <a:t>Examples: sprintf and scanf</a:t>
+            </a:r>
+            <a:endParaRPr/>
+          </a:p>
+        </p:txBody>
+      </p:sp>
+      <p:sp>
+        <p:nvSpPr>
+          <p:cNvPr id="160" name="Google Shape;160;p31"/>
+          <p:cNvSpPr txBox="1"/>
+          <p:nvPr>
+            <p:ph idx="1" type="body"/>
+          </p:nvPr>
+        </p:nvSpPr>
+        <p:spPr>
+          <a:xfrm>
+            <a:off x="539150" y="1328775"/>
+            <a:ext cx="8229600" cy="2800200"/>
+          </a:xfrm>
+          <a:prstGeom prst="rect">
+            <a:avLst/>
+          </a:prstGeom>
+        </p:spPr>
+        <p:txBody>
+          <a:bodyPr anchorCtr="0" anchor="t" bIns="45700" lIns="91425" spcFirstLastPara="1" rIns="91425" wrap="square" tIns="45700">
+            <a:noAutofit/>
+          </a:bodyPr>
+          <a:lstStyle/>
+          <a:p>
+            <a:pPr indent="0" lvl="0" marL="342900" rtl="0" algn="l">
+              <a:lnSpc>
+                <a:spcPct val="115000"/>
+              </a:lnSpc>
+              <a:spcBef>
+                <a:spcPts val="500"/>
+              </a:spcBef>
+              <a:spcAft>
+                <a:spcPts val="0"/>
+              </a:spcAft>
+              <a:buNone/>
+            </a:pPr>
+            <a:r>
+              <a:rPr lang="en-GB" sz="2000">
+                <a:solidFill>
+                  <a:srgbClr val="6AA84F"/>
+                </a:solidFill>
+              </a:rPr>
+              <a:t>char node[20], s2[80];</a:t>
+            </a:r>
+            <a:endParaRPr sz="2000">
+              <a:solidFill>
+                <a:srgbClr val="6AA84F"/>
+              </a:solidFill>
+            </a:endParaRPr>
+          </a:p>
+          <a:p>
+            <a:pPr indent="0" lvl="0" marL="342900" rtl="0" algn="l">
+              <a:lnSpc>
+                <a:spcPct val="115000"/>
+              </a:lnSpc>
+              <a:spcBef>
+                <a:spcPts val="500"/>
+              </a:spcBef>
+              <a:spcAft>
+                <a:spcPts val="0"/>
+              </a:spcAft>
+              <a:buNone/>
+            </a:pPr>
+            <a:r>
+              <a:rPr lang="en-GB" sz="2000">
+                <a:solidFill>
+                  <a:srgbClr val="6AA84F"/>
+                </a:solidFill>
+              </a:rPr>
+              <a:t>char s1[] ="Titania 3.78 7";</a:t>
+            </a:r>
+            <a:endParaRPr sz="2000">
+              <a:solidFill>
+                <a:srgbClr val="6AA84F"/>
+              </a:solidFill>
+            </a:endParaRPr>
+          </a:p>
+          <a:p>
+            <a:pPr indent="0" lvl="0" marL="342900" rtl="0" algn="l">
+              <a:lnSpc>
+                <a:spcPct val="115000"/>
+              </a:lnSpc>
+              <a:spcBef>
+                <a:spcPts val="500"/>
+              </a:spcBef>
+              <a:spcAft>
+                <a:spcPts val="0"/>
+              </a:spcAft>
+              <a:buNone/>
+            </a:pPr>
+            <a:r>
+              <a:rPr lang="en-GB" sz="2000">
+                <a:solidFill>
+                  <a:srgbClr val="6AA84F"/>
+                </a:solidFill>
+              </a:rPr>
+              <a:t>float fload, floadout;</a:t>
+            </a:r>
+            <a:endParaRPr sz="2000">
+              <a:solidFill>
+                <a:srgbClr val="6AA84F"/>
+              </a:solidFill>
+            </a:endParaRPr>
+          </a:p>
+          <a:p>
+            <a:pPr indent="0" lvl="0" marL="342900" rtl="0" algn="l">
+              <a:lnSpc>
+                <a:spcPct val="115000"/>
+              </a:lnSpc>
+              <a:spcBef>
+                <a:spcPts val="500"/>
+              </a:spcBef>
+              <a:spcAft>
+                <a:spcPts val="0"/>
+              </a:spcAft>
+              <a:buNone/>
+            </a:pPr>
+            <a:r>
+              <a:rPr lang="en-GB" sz="2000">
+                <a:solidFill>
+                  <a:srgbClr val="6AA84F"/>
+                </a:solidFill>
+              </a:rPr>
+              <a:t>int nusers, nusersout;</a:t>
+            </a:r>
+            <a:endParaRPr sz="2000">
+              <a:solidFill>
+                <a:srgbClr val="6AA84F"/>
+              </a:solidFill>
+            </a:endParaRPr>
+          </a:p>
+          <a:p>
+            <a:pPr indent="0" lvl="0" marL="342900" rtl="0" algn="l">
+              <a:lnSpc>
+                <a:spcPct val="115000"/>
+              </a:lnSpc>
+              <a:spcBef>
+                <a:spcPts val="500"/>
+              </a:spcBef>
+              <a:spcAft>
+                <a:spcPts val="0"/>
+              </a:spcAft>
+              <a:buNone/>
+            </a:pPr>
+            <a:r>
+              <a:rPr lang="en-GB" sz="2000">
+                <a:solidFill>
+                  <a:srgbClr val="6AA84F"/>
+                </a:solidFill>
+              </a:rPr>
+              <a:t>/*Using sscanf to read data from a string*/</a:t>
+            </a:r>
+            <a:endParaRPr sz="2000">
+              <a:solidFill>
+                <a:srgbClr val="6AA84F"/>
+              </a:solidFill>
+            </a:endParaRPr>
+          </a:p>
+          <a:p>
+            <a:pPr indent="0" lvl="0" marL="342900" rtl="0" algn="l">
+              <a:lnSpc>
+                <a:spcPct val="115000"/>
+              </a:lnSpc>
+              <a:spcBef>
+                <a:spcPts val="500"/>
+              </a:spcBef>
+              <a:spcAft>
+                <a:spcPts val="0"/>
+              </a:spcAft>
+              <a:buNone/>
+            </a:pPr>
+            <a:r>
+              <a:rPr lang="en-GB" sz="2000">
+                <a:solidFill>
+                  <a:srgbClr val="6AA84F"/>
+                </a:solidFill>
+              </a:rPr>
+              <a:t>sscanf(s1, "%s%f%d", node, &amp;floadout, &amp;nusersout);</a:t>
+            </a:r>
+            <a:endParaRPr sz="2000">
+              <a:solidFill>
+                <a:srgbClr val="6AA84F"/>
+              </a:solidFill>
+            </a:endParaRPr>
+          </a:p>
+          <a:p>
+            <a:pPr indent="0" lvl="0" marL="342900" rtl="0" algn="l">
+              <a:lnSpc>
+                <a:spcPct val="115000"/>
+              </a:lnSpc>
+              <a:spcBef>
+                <a:spcPts val="500"/>
+              </a:spcBef>
+              <a:spcAft>
+                <a:spcPts val="0"/>
+              </a:spcAft>
+              <a:buNone/>
+            </a:pPr>
+            <a:r>
+              <a:rPr lang="en-GB" sz="2000">
+                <a:solidFill>
+                  <a:srgbClr val="6AA84F"/>
+                </a:solidFill>
+              </a:rPr>
+              <a:t>sprintf(s2, "%s %f %d", node, fload, nusers); </a:t>
+            </a:r>
+            <a:endParaRPr sz="2000">
+              <a:solidFill>
+                <a:srgbClr val="6AA84F"/>
+              </a:solidFill>
+            </a:endParaRPr>
+          </a:p>
+          <a:p>
+            <a:pPr indent="0" lvl="0" marL="0" rtl="0" algn="l">
+              <a:spcBef>
+                <a:spcPts val="540"/>
+              </a:spcBef>
+              <a:spcAft>
+                <a:spcPts val="0"/>
+              </a:spcAft>
+              <a:buNone/>
+            </a:pPr>
+            <a:r>
+              <a:t/>
+            </a:r>
+            <a:endParaRPr/>
+          </a:p>
+        </p:txBody>
+      </p:sp>
+    </p:spTree>
+  </p:cSld>
+  <p:clrMapOvr>
+    <a:masterClrMapping/>
+  </p:clrMapOvr>
+</p:sld>
+</file>
+
+<file path=ppt/slides/slide19.xml><?xml version="1.0" encoding="utf-8"?>
+<p:sld xmlns:a="http://schemas.openxmlformats.org/drawingml/2006/main" xmlns:r="http://schemas.openxmlformats.org/officeDocument/2006/relationships" xmlns:mc="http://schemas.openxmlformats.org/markup-compatibility/2006" xmlns:mv="urn:schemas-microsoft-com:mac:vml" xmlns:p="http://schemas.openxmlformats.org/presentationml/2006/main" xmlns:c="http://schemas.openxmlformats.org/drawingml/2006/chart" xmlns:dgm="http://schemas.openxmlformats.org/drawingml/2006/diagram" xmlns:o="urn:schemas-microsoft-com:office:office" xmlns:v="urn:schemas-microsoft-com:vml" xmlns:pvml="urn:schemas-microsoft-com:office:powerpoint" xmlns:com="http://schemas.openxmlformats.org/drawingml/2006/compatibility" xmlns:p14="http://schemas.microsoft.com/office/powerpoint/2010/main" xmlns:p15="http://schemas.microsoft.com/office/powerpoint/2012/main" xmlns:ahyp="http://schemas.microsoft.com/office/drawing/2018/hyperlinkcolor">
+  <p:cSld>
+    <p:spTree>
+      <p:nvGrpSpPr>
+        <p:cNvPr id="164" name="Shape 164"/>
+        <p:cNvGrpSpPr/>
+        <p:nvPr/>
+      </p:nvGrpSpPr>
+      <p:grpSpPr>
+        <a:xfrm>
+          <a:off x="0" y="0"/>
+          <a:ext cx="0" cy="0"/>
+          <a:chOff x="0" y="0"/>
+          <a:chExt cx="0" cy="0"/>
+        </a:xfrm>
+      </p:grpSpPr>
+      <p:sp>
+        <p:nvSpPr>
+          <p:cNvPr id="165" name="Google Shape;165;p32"/>
+          <p:cNvSpPr txBox="1"/>
+          <p:nvPr>
+            <p:ph type="title"/>
+          </p:nvPr>
+        </p:nvSpPr>
+        <p:spPr>
+          <a:xfrm>
+            <a:off x="2069100" y="233525"/>
+            <a:ext cx="8229600" cy="571500"/>
+          </a:xfrm>
+          <a:prstGeom prst="rect">
+            <a:avLst/>
+          </a:prstGeom>
+        </p:spPr>
+        <p:txBody>
+          <a:bodyPr anchorCtr="0" anchor="t" bIns="45700" lIns="91425" spcFirstLastPara="1" rIns="91425" wrap="square" tIns="45700">
+            <a:noAutofit/>
+          </a:bodyPr>
+          <a:lstStyle/>
+          <a:p>
+            <a:pPr indent="0" lvl="0" marL="0" rtl="0" algn="l">
+              <a:spcBef>
+                <a:spcPts val="0"/>
+              </a:spcBef>
+              <a:spcAft>
+                <a:spcPts val="0"/>
+              </a:spcAft>
+              <a:buNone/>
+            </a:pPr>
+            <a:r>
+              <a:rPr lang="en-GB"/>
+              <a:t>Functions for Character Manipulation</a:t>
+            </a:r>
+            <a:endParaRPr/>
+          </a:p>
+        </p:txBody>
+      </p:sp>
+      <p:sp>
+        <p:nvSpPr>
+          <p:cNvPr id="166" name="Google Shape;166;p32"/>
+          <p:cNvSpPr txBox="1"/>
+          <p:nvPr>
+            <p:ph idx="1" type="body"/>
+          </p:nvPr>
+        </p:nvSpPr>
+        <p:spPr>
+          <a:xfrm>
+            <a:off x="609600" y="1771650"/>
+            <a:ext cx="8229600" cy="2800200"/>
+          </a:xfrm>
+          <a:prstGeom prst="rect">
+            <a:avLst/>
+          </a:prstGeom>
+        </p:spPr>
+        <p:txBody>
+          <a:bodyPr anchorCtr="0" anchor="t" bIns="45700" lIns="91425" spcFirstLastPara="1" rIns="91425" wrap="square" tIns="45700">
+            <a:noAutofit/>
+          </a:bodyPr>
+          <a:lstStyle/>
+          <a:p>
+            <a:pPr indent="0" lvl="0" marL="0" rtl="0" algn="l">
+              <a:lnSpc>
+                <a:spcPct val="115000"/>
+              </a:lnSpc>
+              <a:spcBef>
+                <a:spcPts val="600"/>
+              </a:spcBef>
+              <a:spcAft>
+                <a:spcPts val="0"/>
+              </a:spcAft>
+              <a:buNone/>
+            </a:pPr>
+            <a:r>
+              <a:rPr lang="en-GB" sz="2400">
+                <a:solidFill>
+                  <a:srgbClr val="000000"/>
+                </a:solidFill>
+              </a:rPr>
+              <a:t>•</a:t>
+            </a:r>
+            <a:r>
+              <a:rPr lang="en-GB" sz="2400">
+                <a:solidFill>
+                  <a:srgbClr val="000099"/>
+                </a:solidFill>
+              </a:rPr>
+              <a:t>library </a:t>
+            </a:r>
+            <a:r>
+              <a:rPr b="1" lang="en-GB" sz="2400">
+                <a:solidFill>
+                  <a:srgbClr val="000099"/>
+                </a:solidFill>
+              </a:rPr>
+              <a:t>ctype.h</a:t>
+            </a:r>
+            <a:endParaRPr b="1" sz="2400">
+              <a:solidFill>
+                <a:srgbClr val="000099"/>
+              </a:solidFill>
+            </a:endParaRPr>
+          </a:p>
+          <a:p>
+            <a:pPr indent="0" lvl="0" marL="0" rtl="0" algn="l">
+              <a:lnSpc>
+                <a:spcPct val="115000"/>
+              </a:lnSpc>
+              <a:spcBef>
+                <a:spcPts val="600"/>
+              </a:spcBef>
+              <a:spcAft>
+                <a:spcPts val="0"/>
+              </a:spcAft>
+              <a:buNone/>
+            </a:pPr>
+            <a:r>
+              <a:rPr lang="en-GB" sz="2400">
+                <a:solidFill>
+                  <a:srgbClr val="000000"/>
+                </a:solidFill>
+              </a:rPr>
+              <a:t>•</a:t>
+            </a:r>
+            <a:r>
+              <a:rPr lang="en-GB" sz="2400">
+                <a:solidFill>
+                  <a:srgbClr val="000099"/>
+                </a:solidFill>
+              </a:rPr>
+              <a:t> </a:t>
+            </a:r>
+            <a:r>
+              <a:rPr b="1" lang="en-GB" sz="2400">
+                <a:solidFill>
+                  <a:srgbClr val="000099"/>
+                </a:solidFill>
+              </a:rPr>
+              <a:t>isdigit</a:t>
+            </a:r>
+            <a:r>
+              <a:rPr lang="en-GB" sz="2400">
+                <a:solidFill>
+                  <a:srgbClr val="000099"/>
+                </a:solidFill>
+              </a:rPr>
+              <a:t>, </a:t>
+            </a:r>
+            <a:r>
+              <a:rPr b="1" lang="en-GB" sz="2400">
+                <a:solidFill>
+                  <a:srgbClr val="000099"/>
+                </a:solidFill>
+              </a:rPr>
+              <a:t>isalpha</a:t>
+            </a:r>
+            <a:r>
+              <a:rPr lang="en-GB" sz="2400">
+                <a:solidFill>
+                  <a:srgbClr val="000099"/>
+                </a:solidFill>
+              </a:rPr>
+              <a:t>, </a:t>
+            </a:r>
+            <a:r>
+              <a:rPr b="1" lang="en-GB" sz="2400">
+                <a:solidFill>
+                  <a:srgbClr val="000099"/>
+                </a:solidFill>
+              </a:rPr>
+              <a:t>islower</a:t>
+            </a:r>
+            <a:r>
+              <a:rPr lang="en-GB" sz="2400">
+                <a:solidFill>
+                  <a:srgbClr val="000099"/>
+                </a:solidFill>
+              </a:rPr>
+              <a:t>, </a:t>
+            </a:r>
+            <a:r>
+              <a:rPr b="1" lang="en-GB" sz="2400">
+                <a:solidFill>
+                  <a:srgbClr val="000099"/>
+                </a:solidFill>
+              </a:rPr>
+              <a:t>isupper</a:t>
+            </a:r>
+            <a:r>
+              <a:rPr lang="en-GB" sz="2400">
+                <a:solidFill>
+                  <a:srgbClr val="000099"/>
+                </a:solidFill>
+              </a:rPr>
+              <a:t>, </a:t>
+            </a:r>
+            <a:r>
+              <a:rPr b="1" lang="en-GB" sz="2400">
+                <a:solidFill>
+                  <a:srgbClr val="000099"/>
+                </a:solidFill>
+              </a:rPr>
+              <a:t>toupper, tolower</a:t>
+            </a:r>
+            <a:r>
+              <a:rPr lang="en-GB" sz="2400">
+                <a:solidFill>
+                  <a:srgbClr val="000099"/>
+                </a:solidFill>
+              </a:rPr>
+              <a:t> and </a:t>
+            </a:r>
+            <a:r>
+              <a:rPr b="1" lang="en-GB" sz="2400">
+                <a:solidFill>
+                  <a:srgbClr val="000099"/>
+                </a:solidFill>
+              </a:rPr>
+              <a:t>isspace</a:t>
+            </a:r>
+            <a:r>
+              <a:rPr lang="en-GB" sz="2400">
+                <a:solidFill>
+                  <a:srgbClr val="000099"/>
+                </a:solidFill>
+              </a:rPr>
+              <a:t>.</a:t>
+            </a:r>
+            <a:endParaRPr sz="2400">
+              <a:solidFill>
+                <a:srgbClr val="000099"/>
+              </a:solidFill>
+            </a:endParaRPr>
+          </a:p>
+          <a:p>
+            <a:pPr indent="0" lvl="0" marL="0" rtl="0" algn="l">
+              <a:lnSpc>
+                <a:spcPct val="115000"/>
+              </a:lnSpc>
+              <a:spcBef>
+                <a:spcPts val="600"/>
+              </a:spcBef>
+              <a:spcAft>
+                <a:spcPts val="0"/>
+              </a:spcAft>
+              <a:buNone/>
+            </a:pPr>
+            <a:r>
+              <a:rPr lang="en-GB" sz="2400">
+                <a:solidFill>
+                  <a:srgbClr val="000000"/>
+                </a:solidFill>
+              </a:rPr>
+              <a:t>•</a:t>
+            </a:r>
+            <a:r>
+              <a:rPr lang="en-GB" sz="2400">
+                <a:solidFill>
+                  <a:srgbClr val="000099"/>
+                </a:solidFill>
+              </a:rPr>
+              <a:t>These functions can be used to perform conversions on a single character or for testing that a character is of a certain type.</a:t>
+            </a:r>
+            <a:endParaRPr sz="2400">
+              <a:solidFill>
+                <a:srgbClr val="000099"/>
+              </a:solidFill>
+            </a:endParaRPr>
+          </a:p>
+          <a:p>
+            <a:pPr indent="0" lvl="0" marL="0" rtl="0" algn="l">
+              <a:spcBef>
+                <a:spcPts val="540"/>
+              </a:spcBef>
+              <a:spcAft>
+                <a:spcPts val="0"/>
+              </a:spcAft>
+              <a:buNone/>
+            </a:pPr>
+            <a:r>
+              <a:t/>
+            </a:r>
+            <a:endParaRPr/>
+          </a:p>
+        </p:txBody>
+      </p:sp>
+    </p:spTree>
+  </p:cSld>
+  <p:clrMapOvr>
+    <a:masterClrMapping/>
+  </p:clrMapOvr>
+</p:sld>
+</file>
+
 <file path=ppt/slides/slide2.xml><?xml version="1.0" encoding="utf-8"?>
 <p:sld xmlns:a="http://schemas.openxmlformats.org/drawingml/2006/main" xmlns:r="http://schemas.openxmlformats.org/officeDocument/2006/relationships" xmlns:mc="http://schemas.openxmlformats.org/markup-compatibility/2006" xmlns:mv="urn:schemas-microsoft-com:mac:vml" xmlns:p="http://schemas.openxmlformats.org/presentationml/2006/main" xmlns:c="http://schemas.openxmlformats.org/drawingml/2006/chart" xmlns:dgm="http://schemas.openxmlformats.org/drawingml/2006/diagram" xmlns:o="urn:schemas-microsoft-com:office:office" xmlns:v="urn:schemas-microsoft-com:vml" xmlns:pvml="urn:schemas-microsoft-com:office:powerpoint" xmlns:com="http://schemas.openxmlformats.org/drawingml/2006/compatibility" xmlns:p14="http://schemas.microsoft.com/office/powerpoint/2010/main" xmlns:p15="http://schemas.microsoft.com/office/powerpoint/2012/main" xmlns:ahyp="http://schemas.microsoft.com/office/drawing/2018/hyperlinkcolor">
   <p:cSld>
@@ -11168,6 +12874,2264 @@
               <a:t>Use data structures to read/write record files</a:t>
             </a:r>
             <a:endParaRPr sz="1600"/>
+          </a:p>
+        </p:txBody>
+      </p:sp>
+    </p:spTree>
+  </p:cSld>
+  <p:clrMapOvr>
+    <a:masterClrMapping/>
+  </p:clrMapOvr>
+</p:sld>
+</file>
+
+<file path=ppt/slides/slide20.xml><?xml version="1.0" encoding="utf-8"?>
+<p:sld xmlns:a="http://schemas.openxmlformats.org/drawingml/2006/main" xmlns:r="http://schemas.openxmlformats.org/officeDocument/2006/relationships" xmlns:mc="http://schemas.openxmlformats.org/markup-compatibility/2006" xmlns:mv="urn:schemas-microsoft-com:mac:vml" xmlns:p="http://schemas.openxmlformats.org/presentationml/2006/main" xmlns:c="http://schemas.openxmlformats.org/drawingml/2006/chart" xmlns:dgm="http://schemas.openxmlformats.org/drawingml/2006/diagram" xmlns:o="urn:schemas-microsoft-com:office:office" xmlns:v="urn:schemas-microsoft-com:vml" xmlns:pvml="urn:schemas-microsoft-com:office:powerpoint" xmlns:com="http://schemas.openxmlformats.org/drawingml/2006/compatibility" xmlns:p14="http://schemas.microsoft.com/office/powerpoint/2010/main" xmlns:p15="http://schemas.microsoft.com/office/powerpoint/2012/main" xmlns:ahyp="http://schemas.microsoft.com/office/drawing/2018/hyperlinkcolor">
+  <p:cSld>
+    <p:spTree>
+      <p:nvGrpSpPr>
+        <p:cNvPr id="170" name="Shape 170"/>
+        <p:cNvGrpSpPr/>
+        <p:nvPr/>
+      </p:nvGrpSpPr>
+      <p:grpSpPr>
+        <a:xfrm>
+          <a:off x="0" y="0"/>
+          <a:ext cx="0" cy="0"/>
+          <a:chOff x="0" y="0"/>
+          <a:chExt cx="0" cy="0"/>
+        </a:xfrm>
+      </p:grpSpPr>
+      <p:sp>
+        <p:nvSpPr>
+          <p:cNvPr id="171" name="Google Shape;171;p33"/>
+          <p:cNvSpPr txBox="1"/>
+          <p:nvPr>
+            <p:ph type="title"/>
+          </p:nvPr>
+        </p:nvSpPr>
+        <p:spPr>
+          <a:xfrm>
+            <a:off x="609600" y="1028700"/>
+            <a:ext cx="8229600" cy="571500"/>
+          </a:xfrm>
+          <a:prstGeom prst="rect">
+            <a:avLst/>
+          </a:prstGeom>
+        </p:spPr>
+        <p:txBody>
+          <a:bodyPr anchorCtr="0" anchor="t" bIns="45700" lIns="91425" spcFirstLastPara="1" rIns="91425" wrap="square" tIns="45700">
+            <a:noAutofit/>
+          </a:bodyPr>
+          <a:lstStyle/>
+          <a:p>
+            <a:pPr indent="0" lvl="0" marL="0" rtl="0" algn="l">
+              <a:spcBef>
+                <a:spcPts val="0"/>
+              </a:spcBef>
+              <a:spcAft>
+                <a:spcPts val="0"/>
+              </a:spcAft>
+              <a:buNone/>
+            </a:pPr>
+            <a:r>
+              <a:rPr lang="en-GB"/>
+              <a:t>String Conversion Functions</a:t>
+            </a:r>
+            <a:endParaRPr/>
+          </a:p>
+        </p:txBody>
+      </p:sp>
+      <p:sp>
+        <p:nvSpPr>
+          <p:cNvPr id="172" name="Google Shape;172;p33"/>
+          <p:cNvSpPr txBox="1"/>
+          <p:nvPr>
+            <p:ph idx="1" type="body"/>
+          </p:nvPr>
+        </p:nvSpPr>
+        <p:spPr>
+          <a:xfrm>
+            <a:off x="609600" y="1771650"/>
+            <a:ext cx="8229600" cy="2800200"/>
+          </a:xfrm>
+          <a:prstGeom prst="rect">
+            <a:avLst/>
+          </a:prstGeom>
+        </p:spPr>
+        <p:txBody>
+          <a:bodyPr anchorCtr="0" anchor="t" bIns="45700" lIns="91425" spcFirstLastPara="1" rIns="91425" wrap="square" tIns="45700">
+            <a:noAutofit/>
+          </a:bodyPr>
+          <a:lstStyle/>
+          <a:p>
+            <a:pPr indent="0" lvl="0" marL="0" rtl="0" algn="l">
+              <a:lnSpc>
+                <a:spcPct val="115000"/>
+              </a:lnSpc>
+              <a:spcBef>
+                <a:spcPts val="600"/>
+              </a:spcBef>
+              <a:spcAft>
+                <a:spcPts val="0"/>
+              </a:spcAft>
+              <a:buNone/>
+            </a:pPr>
+            <a:r>
+              <a:rPr lang="en-GB" sz="2400">
+                <a:solidFill>
+                  <a:srgbClr val="000000"/>
+                </a:solidFill>
+              </a:rPr>
+              <a:t>•</a:t>
+            </a:r>
+            <a:r>
+              <a:rPr lang="en-GB" sz="2400">
+                <a:solidFill>
+                  <a:srgbClr val="000099"/>
+                </a:solidFill>
+              </a:rPr>
+              <a:t>String conversion functions from the general utilities library </a:t>
+            </a:r>
+            <a:r>
+              <a:rPr b="1" lang="en-GB" sz="2400">
+                <a:solidFill>
+                  <a:srgbClr val="000099"/>
+                </a:solidFill>
+              </a:rPr>
+              <a:t>stdlib</a:t>
+            </a:r>
+            <a:endParaRPr b="1" sz="2400">
+              <a:solidFill>
+                <a:srgbClr val="000099"/>
+              </a:solidFill>
+            </a:endParaRPr>
+          </a:p>
+          <a:p>
+            <a:pPr indent="0" lvl="0" marL="0" rtl="0" algn="l">
+              <a:lnSpc>
+                <a:spcPct val="115000"/>
+              </a:lnSpc>
+              <a:spcBef>
+                <a:spcPts val="600"/>
+              </a:spcBef>
+              <a:spcAft>
+                <a:spcPts val="0"/>
+              </a:spcAft>
+              <a:buNone/>
+            </a:pPr>
+            <a:r>
+              <a:rPr lang="en-GB" sz="2400">
+                <a:solidFill>
+                  <a:srgbClr val="000000"/>
+                </a:solidFill>
+              </a:rPr>
+              <a:t>•</a:t>
+            </a:r>
+            <a:r>
+              <a:rPr lang="en-GB" sz="2400">
+                <a:solidFill>
+                  <a:srgbClr val="000099"/>
+                </a:solidFill>
+              </a:rPr>
+              <a:t>convert strings to float, int long int, double, long, and unsigned long data types respectively.</a:t>
+            </a:r>
+            <a:endParaRPr sz="2400">
+              <a:solidFill>
+                <a:srgbClr val="000099"/>
+              </a:solidFill>
+            </a:endParaRPr>
+          </a:p>
+          <a:p>
+            <a:pPr indent="0" lvl="0" marL="0" rtl="0" algn="l">
+              <a:lnSpc>
+                <a:spcPct val="115000"/>
+              </a:lnSpc>
+              <a:spcBef>
+                <a:spcPts val="600"/>
+              </a:spcBef>
+              <a:spcAft>
+                <a:spcPts val="0"/>
+              </a:spcAft>
+              <a:buNone/>
+            </a:pPr>
+            <a:r>
+              <a:rPr lang="en-GB" sz="2400">
+                <a:solidFill>
+                  <a:srgbClr val="000000"/>
+                </a:solidFill>
+              </a:rPr>
+              <a:t>•</a:t>
+            </a:r>
+            <a:r>
+              <a:rPr b="1" lang="en-GB" sz="2400">
+                <a:solidFill>
+                  <a:srgbClr val="000099"/>
+                </a:solidFill>
+              </a:rPr>
+              <a:t>atof</a:t>
+            </a:r>
+            <a:r>
+              <a:rPr lang="en-GB" sz="2400">
+                <a:solidFill>
+                  <a:srgbClr val="000099"/>
+                </a:solidFill>
+              </a:rPr>
+              <a:t>, </a:t>
+            </a:r>
+            <a:r>
+              <a:rPr b="1" lang="en-GB" sz="2400">
+                <a:solidFill>
+                  <a:srgbClr val="000099"/>
+                </a:solidFill>
+              </a:rPr>
+              <a:t>atoi</a:t>
+            </a:r>
+            <a:r>
+              <a:rPr lang="en-GB" sz="2400">
+                <a:solidFill>
+                  <a:srgbClr val="000099"/>
+                </a:solidFill>
+              </a:rPr>
+              <a:t>, </a:t>
+            </a:r>
+            <a:r>
+              <a:rPr b="1" lang="en-GB" sz="2400">
+                <a:solidFill>
+                  <a:srgbClr val="000099"/>
+                </a:solidFill>
+              </a:rPr>
+              <a:t>atol</a:t>
+            </a:r>
+            <a:r>
+              <a:rPr lang="en-GB" sz="2400">
+                <a:solidFill>
+                  <a:srgbClr val="000099"/>
+                </a:solidFill>
+              </a:rPr>
+              <a:t>, </a:t>
+            </a:r>
+            <a:r>
+              <a:rPr b="1" lang="en-GB" sz="2400">
+                <a:solidFill>
+                  <a:srgbClr val="000099"/>
+                </a:solidFill>
+              </a:rPr>
+              <a:t>strtod</a:t>
+            </a:r>
+            <a:r>
+              <a:rPr lang="en-GB" sz="2400">
+                <a:solidFill>
+                  <a:srgbClr val="000099"/>
+                </a:solidFill>
+              </a:rPr>
+              <a:t>, </a:t>
+            </a:r>
+            <a:r>
+              <a:rPr b="1" lang="en-GB" sz="2400">
+                <a:solidFill>
+                  <a:srgbClr val="000099"/>
+                </a:solidFill>
+              </a:rPr>
+              <a:t>strtol</a:t>
+            </a:r>
+            <a:r>
+              <a:rPr lang="en-GB" sz="2400">
+                <a:solidFill>
+                  <a:srgbClr val="000099"/>
+                </a:solidFill>
+              </a:rPr>
+              <a:t>, </a:t>
+            </a:r>
+            <a:r>
+              <a:rPr b="1" lang="en-GB" sz="2400">
+                <a:solidFill>
+                  <a:srgbClr val="000099"/>
+                </a:solidFill>
+              </a:rPr>
+              <a:t>strtoul</a:t>
+            </a:r>
+            <a:endParaRPr b="1" sz="2400">
+              <a:solidFill>
+                <a:srgbClr val="000099"/>
+              </a:solidFill>
+            </a:endParaRPr>
+          </a:p>
+          <a:p>
+            <a:pPr indent="0" lvl="0" marL="0" rtl="0" algn="l">
+              <a:spcBef>
+                <a:spcPts val="540"/>
+              </a:spcBef>
+              <a:spcAft>
+                <a:spcPts val="0"/>
+              </a:spcAft>
+              <a:buNone/>
+            </a:pPr>
+            <a:r>
+              <a:t/>
+            </a:r>
+            <a:endParaRPr/>
+          </a:p>
+        </p:txBody>
+      </p:sp>
+    </p:spTree>
+  </p:cSld>
+  <p:clrMapOvr>
+    <a:masterClrMapping/>
+  </p:clrMapOvr>
+</p:sld>
+</file>
+
+<file path=ppt/slides/slide21.xml><?xml version="1.0" encoding="utf-8"?>
+<p:sld xmlns:a="http://schemas.openxmlformats.org/drawingml/2006/main" xmlns:r="http://schemas.openxmlformats.org/officeDocument/2006/relationships" xmlns:mc="http://schemas.openxmlformats.org/markup-compatibility/2006" xmlns:mv="urn:schemas-microsoft-com:mac:vml" xmlns:p="http://schemas.openxmlformats.org/presentationml/2006/main" xmlns:c="http://schemas.openxmlformats.org/drawingml/2006/chart" xmlns:dgm="http://schemas.openxmlformats.org/drawingml/2006/diagram" xmlns:o="urn:schemas-microsoft-com:office:office" xmlns:v="urn:schemas-microsoft-com:vml" xmlns:pvml="urn:schemas-microsoft-com:office:powerpoint" xmlns:com="http://schemas.openxmlformats.org/drawingml/2006/compatibility" xmlns:p14="http://schemas.microsoft.com/office/powerpoint/2010/main" xmlns:p15="http://schemas.microsoft.com/office/powerpoint/2012/main" xmlns:ahyp="http://schemas.microsoft.com/office/drawing/2018/hyperlinkcolor">
+  <p:cSld>
+    <p:spTree>
+      <p:nvGrpSpPr>
+        <p:cNvPr id="176" name="Shape 176"/>
+        <p:cNvGrpSpPr/>
+        <p:nvPr/>
+      </p:nvGrpSpPr>
+      <p:grpSpPr>
+        <a:xfrm>
+          <a:off x="0" y="0"/>
+          <a:ext cx="0" cy="0"/>
+          <a:chOff x="0" y="0"/>
+          <a:chExt cx="0" cy="0"/>
+        </a:xfrm>
+      </p:grpSpPr>
+      <p:sp>
+        <p:nvSpPr>
+          <p:cNvPr id="177" name="Google Shape;177;p34"/>
+          <p:cNvSpPr txBox="1"/>
+          <p:nvPr>
+            <p:ph type="title"/>
+          </p:nvPr>
+        </p:nvSpPr>
+        <p:spPr>
+          <a:xfrm>
+            <a:off x="2139550" y="243575"/>
+            <a:ext cx="8229600" cy="571500"/>
+          </a:xfrm>
+          <a:prstGeom prst="rect">
+            <a:avLst/>
+          </a:prstGeom>
+        </p:spPr>
+        <p:txBody>
+          <a:bodyPr anchorCtr="0" anchor="t" bIns="45700" lIns="91425" spcFirstLastPara="1" rIns="91425" wrap="square" tIns="45700">
+            <a:noAutofit/>
+          </a:bodyPr>
+          <a:lstStyle/>
+          <a:p>
+            <a:pPr indent="0" lvl="0" marL="0" rtl="0" algn="l">
+              <a:spcBef>
+                <a:spcPts val="0"/>
+              </a:spcBef>
+              <a:spcAft>
+                <a:spcPts val="0"/>
+              </a:spcAft>
+              <a:buNone/>
+            </a:pPr>
+            <a:r>
+              <a:rPr lang="en-GB"/>
+              <a:t>String Manipulation</a:t>
+            </a:r>
+            <a:endParaRPr/>
+          </a:p>
+        </p:txBody>
+      </p:sp>
+      <p:sp>
+        <p:nvSpPr>
+          <p:cNvPr id="178" name="Google Shape;178;p34"/>
+          <p:cNvSpPr txBox="1"/>
+          <p:nvPr>
+            <p:ph idx="1" type="body"/>
+          </p:nvPr>
+        </p:nvSpPr>
+        <p:spPr>
+          <a:xfrm>
+            <a:off x="539125" y="1171650"/>
+            <a:ext cx="8229600" cy="2800200"/>
+          </a:xfrm>
+          <a:prstGeom prst="rect">
+            <a:avLst/>
+          </a:prstGeom>
+        </p:spPr>
+        <p:txBody>
+          <a:bodyPr anchorCtr="0" anchor="t" bIns="45700" lIns="91425" spcFirstLastPara="1" rIns="91425" wrap="square" tIns="45700">
+            <a:noAutofit/>
+          </a:bodyPr>
+          <a:lstStyle/>
+          <a:p>
+            <a:pPr indent="0" lvl="0" marL="0" rtl="0" algn="l">
+              <a:lnSpc>
+                <a:spcPct val="115000"/>
+              </a:lnSpc>
+              <a:spcBef>
+                <a:spcPts val="600"/>
+              </a:spcBef>
+              <a:spcAft>
+                <a:spcPts val="0"/>
+              </a:spcAft>
+              <a:buNone/>
+            </a:pPr>
+            <a:r>
+              <a:rPr lang="en-GB" sz="2400">
+                <a:solidFill>
+                  <a:srgbClr val="000000"/>
+                </a:solidFill>
+              </a:rPr>
+              <a:t>•</a:t>
+            </a:r>
+            <a:r>
+              <a:rPr lang="en-GB" sz="2400">
+                <a:solidFill>
+                  <a:srgbClr val="000099"/>
+                </a:solidFill>
+              </a:rPr>
+              <a:t>The string handling library </a:t>
+            </a:r>
+            <a:r>
+              <a:rPr b="1" lang="en-GB" sz="2400">
+                <a:solidFill>
+                  <a:srgbClr val="000099"/>
+                </a:solidFill>
+              </a:rPr>
+              <a:t>string.h</a:t>
+            </a:r>
+            <a:endParaRPr b="1" sz="2400">
+              <a:solidFill>
+                <a:srgbClr val="000099"/>
+              </a:solidFill>
+            </a:endParaRPr>
+          </a:p>
+          <a:p>
+            <a:pPr indent="0" lvl="0" marL="0" rtl="0" algn="l">
+              <a:lnSpc>
+                <a:spcPct val="115000"/>
+              </a:lnSpc>
+              <a:spcBef>
+                <a:spcPts val="600"/>
+              </a:spcBef>
+              <a:spcAft>
+                <a:spcPts val="0"/>
+              </a:spcAft>
+              <a:buNone/>
+            </a:pPr>
+            <a:r>
+              <a:rPr lang="en-GB" sz="2400">
+                <a:solidFill>
+                  <a:srgbClr val="000000"/>
+                </a:solidFill>
+              </a:rPr>
+              <a:t>•</a:t>
+            </a:r>
+            <a:r>
+              <a:rPr lang="en-GB" sz="2400">
+                <a:solidFill>
+                  <a:srgbClr val="000099"/>
+                </a:solidFill>
+              </a:rPr>
+              <a:t>provides a range of string manipulation functions for copying, concatenating, comparison, tokenizing and for identifying the occurrence and positions of particular characters in a string.</a:t>
+            </a:r>
+            <a:endParaRPr sz="2400">
+              <a:solidFill>
+                <a:srgbClr val="000099"/>
+              </a:solidFill>
+            </a:endParaRPr>
+          </a:p>
+          <a:p>
+            <a:pPr indent="0" lvl="0" marL="0" rtl="0" algn="l">
+              <a:lnSpc>
+                <a:spcPct val="115000"/>
+              </a:lnSpc>
+              <a:spcBef>
+                <a:spcPts val="600"/>
+              </a:spcBef>
+              <a:spcAft>
+                <a:spcPts val="0"/>
+              </a:spcAft>
+              <a:buNone/>
+            </a:pPr>
+            <a:r>
+              <a:rPr lang="en-GB" sz="2400">
+                <a:solidFill>
+                  <a:srgbClr val="000000"/>
+                </a:solidFill>
+              </a:rPr>
+              <a:t>•</a:t>
+            </a:r>
+            <a:r>
+              <a:rPr lang="en-GB" sz="2400">
+                <a:solidFill>
+                  <a:srgbClr val="000099"/>
+                </a:solidFill>
+              </a:rPr>
+              <a:t>E.g. </a:t>
+            </a:r>
+            <a:r>
+              <a:rPr b="1" lang="en-GB" sz="2400">
+                <a:solidFill>
+                  <a:srgbClr val="000099"/>
+                </a:solidFill>
+              </a:rPr>
+              <a:t>strcpy</a:t>
+            </a:r>
+            <a:r>
+              <a:rPr lang="en-GB" sz="2400">
+                <a:solidFill>
+                  <a:srgbClr val="000099"/>
+                </a:solidFill>
+              </a:rPr>
+              <a:t>, </a:t>
+            </a:r>
+            <a:r>
+              <a:rPr b="1" lang="en-GB" sz="2400">
+                <a:solidFill>
+                  <a:srgbClr val="000099"/>
+                </a:solidFill>
+              </a:rPr>
+              <a:t>strlen</a:t>
+            </a:r>
+            <a:r>
+              <a:rPr lang="en-GB" sz="2400">
+                <a:solidFill>
+                  <a:srgbClr val="000099"/>
+                </a:solidFill>
+              </a:rPr>
+              <a:t>, </a:t>
+            </a:r>
+            <a:r>
+              <a:rPr b="1" lang="en-GB" sz="2400">
+                <a:solidFill>
+                  <a:srgbClr val="000099"/>
+                </a:solidFill>
+              </a:rPr>
+              <a:t>strcmp</a:t>
+            </a:r>
+            <a:r>
+              <a:rPr lang="en-GB" sz="2400">
+                <a:solidFill>
+                  <a:srgbClr val="000099"/>
+                </a:solidFill>
+              </a:rPr>
+              <a:t> and </a:t>
+            </a:r>
+            <a:r>
+              <a:rPr b="1" lang="en-GB" sz="2400">
+                <a:solidFill>
+                  <a:srgbClr val="000099"/>
+                </a:solidFill>
+              </a:rPr>
+              <a:t>strtok</a:t>
+            </a:r>
+            <a:r>
+              <a:rPr lang="en-GB" sz="2400">
+                <a:solidFill>
+                  <a:srgbClr val="000099"/>
+                </a:solidFill>
+              </a:rPr>
+              <a:t>.</a:t>
+            </a:r>
+            <a:endParaRPr sz="2400">
+              <a:solidFill>
+                <a:srgbClr val="000099"/>
+              </a:solidFill>
+            </a:endParaRPr>
+          </a:p>
+          <a:p>
+            <a:pPr indent="0" lvl="0" marL="0" rtl="0" algn="l">
+              <a:lnSpc>
+                <a:spcPct val="115000"/>
+              </a:lnSpc>
+              <a:spcBef>
+                <a:spcPts val="600"/>
+              </a:spcBef>
+              <a:spcAft>
+                <a:spcPts val="0"/>
+              </a:spcAft>
+              <a:buNone/>
+            </a:pPr>
+            <a:r>
+              <a:rPr lang="en-GB" sz="2400">
+                <a:solidFill>
+                  <a:srgbClr val="000000"/>
+                </a:solidFill>
+              </a:rPr>
+              <a:t>•</a:t>
+            </a:r>
+            <a:r>
+              <a:rPr lang="en-GB" sz="2400">
+                <a:solidFill>
+                  <a:srgbClr val="000099"/>
+                </a:solidFill>
+              </a:rPr>
+              <a:t>See the examples</a:t>
+            </a:r>
+            <a:endParaRPr sz="2400">
+              <a:solidFill>
+                <a:srgbClr val="000099"/>
+              </a:solidFill>
+            </a:endParaRPr>
+          </a:p>
+          <a:p>
+            <a:pPr indent="0" lvl="0" marL="0" rtl="0" algn="l">
+              <a:spcBef>
+                <a:spcPts val="540"/>
+              </a:spcBef>
+              <a:spcAft>
+                <a:spcPts val="0"/>
+              </a:spcAft>
+              <a:buNone/>
+            </a:pPr>
+            <a:r>
+              <a:t/>
+            </a:r>
+            <a:endParaRPr/>
+          </a:p>
+        </p:txBody>
+      </p:sp>
+    </p:spTree>
+  </p:cSld>
+  <p:clrMapOvr>
+    <a:masterClrMapping/>
+  </p:clrMapOvr>
+</p:sld>
+</file>
+
+<file path=ppt/slides/slide22.xml><?xml version="1.0" encoding="utf-8"?>
+<p:sld xmlns:a="http://schemas.openxmlformats.org/drawingml/2006/main" xmlns:r="http://schemas.openxmlformats.org/officeDocument/2006/relationships" xmlns:mc="http://schemas.openxmlformats.org/markup-compatibility/2006" xmlns:mv="urn:schemas-microsoft-com:mac:vml" xmlns:p="http://schemas.openxmlformats.org/presentationml/2006/main" xmlns:c="http://schemas.openxmlformats.org/drawingml/2006/chart" xmlns:dgm="http://schemas.openxmlformats.org/drawingml/2006/diagram" xmlns:o="urn:schemas-microsoft-com:office:office" xmlns:v="urn:schemas-microsoft-com:vml" xmlns:pvml="urn:schemas-microsoft-com:office:powerpoint" xmlns:com="http://schemas.openxmlformats.org/drawingml/2006/compatibility" xmlns:p14="http://schemas.microsoft.com/office/powerpoint/2010/main" xmlns:p15="http://schemas.microsoft.com/office/powerpoint/2012/main" xmlns:ahyp="http://schemas.microsoft.com/office/drawing/2018/hyperlinkcolor">
+  <p:cSld>
+    <p:spTree>
+      <p:nvGrpSpPr>
+        <p:cNvPr id="182" name="Shape 182"/>
+        <p:cNvGrpSpPr/>
+        <p:nvPr/>
+      </p:nvGrpSpPr>
+      <p:grpSpPr>
+        <a:xfrm>
+          <a:off x="0" y="0"/>
+          <a:ext cx="0" cy="0"/>
+          <a:chOff x="0" y="0"/>
+          <a:chExt cx="0" cy="0"/>
+        </a:xfrm>
+      </p:grpSpPr>
+      <p:sp>
+        <p:nvSpPr>
+          <p:cNvPr id="183" name="Google Shape;183;p35"/>
+          <p:cNvSpPr txBox="1"/>
+          <p:nvPr>
+            <p:ph type="title"/>
+          </p:nvPr>
+        </p:nvSpPr>
+        <p:spPr>
+          <a:xfrm>
+            <a:off x="609600" y="1028700"/>
+            <a:ext cx="8229600" cy="571500"/>
+          </a:xfrm>
+          <a:prstGeom prst="rect">
+            <a:avLst/>
+          </a:prstGeom>
+        </p:spPr>
+        <p:txBody>
+          <a:bodyPr anchorCtr="0" anchor="t" bIns="45700" lIns="91425" spcFirstLastPara="1" rIns="91425" wrap="square" tIns="45700">
+            <a:noAutofit/>
+          </a:bodyPr>
+          <a:lstStyle/>
+          <a:p>
+            <a:pPr indent="0" lvl="0" marL="0" rtl="0" algn="l">
+              <a:spcBef>
+                <a:spcPts val="0"/>
+              </a:spcBef>
+              <a:spcAft>
+                <a:spcPts val="0"/>
+              </a:spcAft>
+              <a:buNone/>
+            </a:pPr>
+            <a:r>
+              <a:t/>
+            </a:r>
+            <a:endParaRPr/>
+          </a:p>
+        </p:txBody>
+      </p:sp>
+      <p:sp>
+        <p:nvSpPr>
+          <p:cNvPr id="184" name="Google Shape;184;p35"/>
+          <p:cNvSpPr txBox="1"/>
+          <p:nvPr>
+            <p:ph idx="1" type="body"/>
+          </p:nvPr>
+        </p:nvSpPr>
+        <p:spPr>
+          <a:xfrm>
+            <a:off x="609600" y="1771650"/>
+            <a:ext cx="8229600" cy="2800200"/>
+          </a:xfrm>
+          <a:prstGeom prst="rect">
+            <a:avLst/>
+          </a:prstGeom>
+        </p:spPr>
+        <p:txBody>
+          <a:bodyPr anchorCtr="0" anchor="t" bIns="45700" lIns="91425" spcFirstLastPara="1" rIns="91425" wrap="square" tIns="45700">
+            <a:noAutofit/>
+          </a:bodyPr>
+          <a:lstStyle/>
+          <a:p>
+            <a:pPr indent="0" lvl="0" marL="0" rtl="0" algn="l">
+              <a:spcBef>
+                <a:spcPts val="540"/>
+              </a:spcBef>
+              <a:spcAft>
+                <a:spcPts val="0"/>
+              </a:spcAft>
+              <a:buNone/>
+            </a:pPr>
+            <a:r>
+              <a:t/>
+            </a:r>
+            <a:endParaRPr/>
+          </a:p>
+        </p:txBody>
+      </p:sp>
+    </p:spTree>
+  </p:cSld>
+  <p:clrMapOvr>
+    <a:masterClrMapping/>
+  </p:clrMapOvr>
+</p:sld>
+</file>
+
+<file path=ppt/slides/slide23.xml><?xml version="1.0" encoding="utf-8"?>
+<p:sld xmlns:a="http://schemas.openxmlformats.org/drawingml/2006/main" xmlns:r="http://schemas.openxmlformats.org/officeDocument/2006/relationships" xmlns:mc="http://schemas.openxmlformats.org/markup-compatibility/2006" xmlns:mv="urn:schemas-microsoft-com:mac:vml" xmlns:p="http://schemas.openxmlformats.org/presentationml/2006/main" xmlns:c="http://schemas.openxmlformats.org/drawingml/2006/chart" xmlns:dgm="http://schemas.openxmlformats.org/drawingml/2006/diagram" xmlns:o="urn:schemas-microsoft-com:office:office" xmlns:v="urn:schemas-microsoft-com:vml" xmlns:pvml="urn:schemas-microsoft-com:office:powerpoint" xmlns:com="http://schemas.openxmlformats.org/drawingml/2006/compatibility" xmlns:p14="http://schemas.microsoft.com/office/powerpoint/2010/main" xmlns:p15="http://schemas.microsoft.com/office/powerpoint/2012/main" xmlns:ahyp="http://schemas.microsoft.com/office/drawing/2018/hyperlinkcolor">
+  <p:cSld>
+    <p:spTree>
+      <p:nvGrpSpPr>
+        <p:cNvPr id="188" name="Shape 188"/>
+        <p:cNvGrpSpPr/>
+        <p:nvPr/>
+      </p:nvGrpSpPr>
+      <p:grpSpPr>
+        <a:xfrm>
+          <a:off x="0" y="0"/>
+          <a:ext cx="0" cy="0"/>
+          <a:chOff x="0" y="0"/>
+          <a:chExt cx="0" cy="0"/>
+        </a:xfrm>
+      </p:grpSpPr>
+      <p:sp>
+        <p:nvSpPr>
+          <p:cNvPr id="189" name="Google Shape;189;p36"/>
+          <p:cNvSpPr txBox="1"/>
+          <p:nvPr>
+            <p:ph type="title"/>
+          </p:nvPr>
+        </p:nvSpPr>
+        <p:spPr>
+          <a:xfrm>
+            <a:off x="2139575" y="253650"/>
+            <a:ext cx="8229600" cy="571500"/>
+          </a:xfrm>
+          <a:prstGeom prst="rect">
+            <a:avLst/>
+          </a:prstGeom>
+        </p:spPr>
+        <p:txBody>
+          <a:bodyPr anchorCtr="0" anchor="t" bIns="45700" lIns="91425" spcFirstLastPara="1" rIns="91425" wrap="square" tIns="45700">
+            <a:noAutofit/>
+          </a:bodyPr>
+          <a:lstStyle/>
+          <a:p>
+            <a:pPr indent="0" lvl="0" marL="0" rtl="0" algn="l">
+              <a:spcBef>
+                <a:spcPts val="0"/>
+              </a:spcBef>
+              <a:spcAft>
+                <a:spcPts val="0"/>
+              </a:spcAft>
+              <a:buNone/>
+            </a:pPr>
+            <a:r>
+              <a:rPr lang="en-GB"/>
+              <a:t>Practice:String Copy and Concatenation</a:t>
+            </a:r>
+            <a:endParaRPr/>
+          </a:p>
+        </p:txBody>
+      </p:sp>
+      <p:sp>
+        <p:nvSpPr>
+          <p:cNvPr id="190" name="Google Shape;190;p36"/>
+          <p:cNvSpPr txBox="1"/>
+          <p:nvPr>
+            <p:ph idx="1" type="body"/>
+          </p:nvPr>
+        </p:nvSpPr>
+        <p:spPr>
+          <a:xfrm>
+            <a:off x="519000" y="1389175"/>
+            <a:ext cx="8229600" cy="2800200"/>
+          </a:xfrm>
+          <a:prstGeom prst="rect">
+            <a:avLst/>
+          </a:prstGeom>
+        </p:spPr>
+        <p:txBody>
+          <a:bodyPr anchorCtr="0" anchor="t" bIns="45700" lIns="91425" spcFirstLastPara="1" rIns="91425" wrap="square" tIns="45700">
+            <a:noAutofit/>
+          </a:bodyPr>
+          <a:lstStyle/>
+          <a:p>
+            <a:pPr indent="0" lvl="0" marL="0" rtl="0" algn="l">
+              <a:spcBef>
+                <a:spcPts val="540"/>
+              </a:spcBef>
+              <a:spcAft>
+                <a:spcPts val="0"/>
+              </a:spcAft>
+              <a:buNone/>
+            </a:pPr>
+            <a:r>
+              <a:rPr lang="en-GB" sz="900">
+                <a:solidFill>
+                  <a:srgbClr val="6AA84F"/>
+                </a:solidFill>
+              </a:rPr>
+              <a:t>// Create some strings </a:t>
+            </a:r>
+            <a:endParaRPr sz="900">
+              <a:solidFill>
+                <a:srgbClr val="6AA84F"/>
+              </a:solidFill>
+            </a:endParaRPr>
+          </a:p>
+          <a:p>
+            <a:pPr indent="0" lvl="0" marL="0" rtl="0" algn="l">
+              <a:spcBef>
+                <a:spcPts val="540"/>
+              </a:spcBef>
+              <a:spcAft>
+                <a:spcPts val="0"/>
+              </a:spcAft>
+              <a:buNone/>
+            </a:pPr>
+            <a:r>
+              <a:rPr lang="en-GB" sz="900">
+                <a:solidFill>
+                  <a:srgbClr val="6AA84F"/>
+                </a:solidFill>
+              </a:rPr>
+              <a:t>char szStringX[20] = "Hello, World"; </a:t>
+            </a:r>
+            <a:endParaRPr sz="900">
+              <a:solidFill>
+                <a:srgbClr val="6AA84F"/>
+              </a:solidFill>
+            </a:endParaRPr>
+          </a:p>
+          <a:p>
+            <a:pPr indent="0" lvl="0" marL="0" rtl="0" algn="l">
+              <a:spcBef>
+                <a:spcPts val="540"/>
+              </a:spcBef>
+              <a:spcAft>
+                <a:spcPts val="0"/>
+              </a:spcAft>
+              <a:buNone/>
+            </a:pPr>
+            <a:r>
+              <a:rPr lang="en-GB" sz="900">
+                <a:solidFill>
+                  <a:srgbClr val="6AA84F"/>
+                </a:solidFill>
+              </a:rPr>
+              <a:t>char szStringY[20]; </a:t>
+            </a:r>
+            <a:endParaRPr sz="900">
+              <a:solidFill>
+                <a:srgbClr val="6AA84F"/>
+              </a:solidFill>
+            </a:endParaRPr>
+          </a:p>
+          <a:p>
+            <a:pPr indent="0" lvl="0" marL="0" rtl="0" algn="l">
+              <a:spcBef>
+                <a:spcPts val="540"/>
+              </a:spcBef>
+              <a:spcAft>
+                <a:spcPts val="0"/>
+              </a:spcAft>
+              <a:buNone/>
+            </a:pPr>
+            <a:r>
+              <a:rPr lang="en-GB" sz="900">
+                <a:solidFill>
+                  <a:srgbClr val="6AA84F"/>
+                </a:solidFill>
+              </a:rPr>
+              <a:t>char szStringZ[20] = "Hi, World"; </a:t>
+            </a:r>
+            <a:endParaRPr sz="900">
+              <a:solidFill>
+                <a:srgbClr val="6AA84F"/>
+              </a:solidFill>
+            </a:endParaRPr>
+          </a:p>
+          <a:p>
+            <a:pPr indent="0" lvl="0" marL="0" rtl="0" algn="l">
+              <a:spcBef>
+                <a:spcPts val="540"/>
+              </a:spcBef>
+              <a:spcAft>
+                <a:spcPts val="0"/>
+              </a:spcAft>
+              <a:buNone/>
+            </a:pPr>
+            <a:r>
+              <a:rPr lang="en-GB" sz="900">
+                <a:solidFill>
+                  <a:srgbClr val="6AA84F"/>
+                </a:solidFill>
+              </a:rPr>
+              <a:t>// Copy szStringX to szStringY </a:t>
+            </a:r>
+            <a:endParaRPr sz="900">
+              <a:solidFill>
+                <a:srgbClr val="6AA84F"/>
+              </a:solidFill>
+            </a:endParaRPr>
+          </a:p>
+          <a:p>
+            <a:pPr indent="0" lvl="0" marL="0" rtl="0" algn="l">
+              <a:spcBef>
+                <a:spcPts val="540"/>
+              </a:spcBef>
+              <a:spcAft>
+                <a:spcPts val="0"/>
+              </a:spcAft>
+              <a:buNone/>
+            </a:pPr>
+            <a:r>
+              <a:rPr lang="en-GB" sz="900">
+                <a:solidFill>
+                  <a:srgbClr val="6AA84F"/>
+                </a:solidFill>
+              </a:rPr>
+              <a:t>strcpy(szStringY,szStringX); </a:t>
+            </a:r>
+            <a:endParaRPr sz="900">
+              <a:solidFill>
+                <a:srgbClr val="6AA84F"/>
+              </a:solidFill>
+            </a:endParaRPr>
+          </a:p>
+          <a:p>
+            <a:pPr indent="0" lvl="0" marL="0" rtl="0" algn="l">
+              <a:spcBef>
+                <a:spcPts val="540"/>
+              </a:spcBef>
+              <a:spcAft>
+                <a:spcPts val="0"/>
+              </a:spcAft>
+              <a:buNone/>
+            </a:pPr>
+            <a:r>
+              <a:rPr lang="en-GB" sz="900">
+                <a:solidFill>
+                  <a:srgbClr val="6AA84F"/>
+                </a:solidFill>
+              </a:rPr>
+              <a:t>printf("szStringX is %s\n",szStringX); </a:t>
+            </a:r>
+            <a:endParaRPr sz="900">
+              <a:solidFill>
+                <a:srgbClr val="6AA84F"/>
+              </a:solidFill>
+            </a:endParaRPr>
+          </a:p>
+          <a:p>
+            <a:pPr indent="0" lvl="0" marL="0" rtl="0" algn="l">
+              <a:spcBef>
+                <a:spcPts val="540"/>
+              </a:spcBef>
+              <a:spcAft>
+                <a:spcPts val="0"/>
+              </a:spcAft>
+              <a:buNone/>
+            </a:pPr>
+            <a:r>
+              <a:rPr lang="en-GB" sz="900">
+                <a:solidFill>
+                  <a:srgbClr val="6AA84F"/>
+                </a:solidFill>
+              </a:rPr>
+              <a:t>printf("szStringY is %s\n",szStringY); </a:t>
+            </a:r>
+            <a:endParaRPr sz="900">
+              <a:solidFill>
+                <a:srgbClr val="6AA84F"/>
+              </a:solidFill>
+            </a:endParaRPr>
+          </a:p>
+          <a:p>
+            <a:pPr indent="0" lvl="0" marL="0" rtl="0" algn="l">
+              <a:spcBef>
+                <a:spcPts val="540"/>
+              </a:spcBef>
+              <a:spcAft>
+                <a:spcPts val="0"/>
+              </a:spcAft>
+              <a:buNone/>
+            </a:pPr>
+            <a:r>
+              <a:rPr lang="en-GB" sz="900">
+                <a:solidFill>
+                  <a:srgbClr val="6AA84F"/>
+                </a:solidFill>
+              </a:rPr>
+              <a:t>// Compare szStringX and szStringY to see if they are the same </a:t>
+            </a:r>
+            <a:endParaRPr sz="900">
+              <a:solidFill>
+                <a:srgbClr val="6AA84F"/>
+              </a:solidFill>
+            </a:endParaRPr>
+          </a:p>
+          <a:p>
+            <a:pPr indent="0" lvl="0" marL="0" rtl="0" algn="l">
+              <a:spcBef>
+                <a:spcPts val="540"/>
+              </a:spcBef>
+              <a:spcAft>
+                <a:spcPts val="0"/>
+              </a:spcAft>
+              <a:buNone/>
+            </a:pPr>
+            <a:r>
+              <a:rPr lang="en-GB" sz="900">
+                <a:solidFill>
+                  <a:srgbClr val="6AA84F"/>
+                </a:solidFill>
+              </a:rPr>
+              <a:t>if(!strcmp(szStringX,szStringY)) </a:t>
+            </a:r>
+            <a:endParaRPr sz="900">
+              <a:solidFill>
+                <a:srgbClr val="6AA84F"/>
+              </a:solidFill>
+            </a:endParaRPr>
+          </a:p>
+          <a:p>
+            <a:pPr indent="0" lvl="0" marL="0" rtl="0" algn="l">
+              <a:spcBef>
+                <a:spcPts val="540"/>
+              </a:spcBef>
+              <a:spcAft>
+                <a:spcPts val="0"/>
+              </a:spcAft>
+              <a:buNone/>
+            </a:pPr>
+            <a:r>
+              <a:rPr lang="en-GB" sz="900">
+                <a:solidFill>
+                  <a:srgbClr val="6AA84F"/>
+                </a:solidFill>
+              </a:rPr>
+              <a:t>printf("Strings are the same\n"); </a:t>
+            </a:r>
+            <a:endParaRPr sz="900">
+              <a:solidFill>
+                <a:srgbClr val="6AA84F"/>
+              </a:solidFill>
+            </a:endParaRPr>
+          </a:p>
+          <a:p>
+            <a:pPr indent="0" lvl="0" marL="0" rtl="0" algn="l">
+              <a:spcBef>
+                <a:spcPts val="540"/>
+              </a:spcBef>
+              <a:spcAft>
+                <a:spcPts val="0"/>
+              </a:spcAft>
+              <a:buNone/>
+            </a:pPr>
+            <a:r>
+              <a:rPr lang="en-GB" sz="900">
+                <a:solidFill>
+                  <a:srgbClr val="6AA84F"/>
+                </a:solidFill>
+              </a:rPr>
+              <a:t>else printf("Strings are NOT the same\n"); </a:t>
+            </a:r>
+            <a:endParaRPr sz="900">
+              <a:solidFill>
+                <a:srgbClr val="6AA84F"/>
+              </a:solidFill>
+            </a:endParaRPr>
+          </a:p>
+          <a:p>
+            <a:pPr indent="0" lvl="0" marL="0" rtl="0" algn="l">
+              <a:spcBef>
+                <a:spcPts val="540"/>
+              </a:spcBef>
+              <a:spcAft>
+                <a:spcPts val="0"/>
+              </a:spcAft>
+              <a:buNone/>
+            </a:pPr>
+            <a:r>
+              <a:rPr lang="en-GB" sz="900">
+                <a:solidFill>
+                  <a:srgbClr val="6AA84F"/>
+                </a:solidFill>
+              </a:rPr>
+              <a:t>// Compare szStringX and szStringY to see if they are the same </a:t>
+            </a:r>
+            <a:endParaRPr sz="900">
+              <a:solidFill>
+                <a:srgbClr val="6AA84F"/>
+              </a:solidFill>
+            </a:endParaRPr>
+          </a:p>
+          <a:p>
+            <a:pPr indent="0" lvl="0" marL="0" rtl="0" algn="l">
+              <a:spcBef>
+                <a:spcPts val="540"/>
+              </a:spcBef>
+              <a:spcAft>
+                <a:spcPts val="0"/>
+              </a:spcAft>
+              <a:buNone/>
+            </a:pPr>
+            <a:r>
+              <a:rPr lang="en-GB" sz="900">
+                <a:solidFill>
+                  <a:srgbClr val="6AA84F"/>
+                </a:solidFill>
+              </a:rPr>
+              <a:t>if(!strcmp(szStringX,szStringZ))</a:t>
+            </a:r>
+            <a:endParaRPr sz="900">
+              <a:solidFill>
+                <a:srgbClr val="6AA84F"/>
+              </a:solidFill>
+            </a:endParaRPr>
+          </a:p>
+          <a:p>
+            <a:pPr indent="0" lvl="0" marL="0" rtl="0" algn="l">
+              <a:spcBef>
+                <a:spcPts val="540"/>
+              </a:spcBef>
+              <a:spcAft>
+                <a:spcPts val="0"/>
+              </a:spcAft>
+              <a:buNone/>
+            </a:pPr>
+            <a:r>
+              <a:rPr lang="en-GB" sz="900">
+                <a:solidFill>
+                  <a:srgbClr val="6AA84F"/>
+                </a:solidFill>
+              </a:rPr>
+              <a:t> 	printf("Strings are the same\n"); </a:t>
+            </a:r>
+            <a:endParaRPr sz="900">
+              <a:solidFill>
+                <a:srgbClr val="6AA84F"/>
+              </a:solidFill>
+            </a:endParaRPr>
+          </a:p>
+          <a:p>
+            <a:pPr indent="0" lvl="0" marL="0" rtl="0" algn="l">
+              <a:spcBef>
+                <a:spcPts val="540"/>
+              </a:spcBef>
+              <a:spcAft>
+                <a:spcPts val="0"/>
+              </a:spcAft>
+              <a:buNone/>
+            </a:pPr>
+            <a:r>
+              <a:rPr lang="en-GB" sz="900">
+                <a:solidFill>
+                  <a:srgbClr val="6AA84F"/>
+                </a:solidFill>
+              </a:rPr>
+              <a:t>else printf("Strings are NOT the same\n");</a:t>
+            </a:r>
+            <a:endParaRPr sz="900">
+              <a:solidFill>
+                <a:srgbClr val="6AA84F"/>
+              </a:solidFill>
+            </a:endParaRPr>
+          </a:p>
+        </p:txBody>
+      </p:sp>
+    </p:spTree>
+  </p:cSld>
+  <p:clrMapOvr>
+    <a:masterClrMapping/>
+  </p:clrMapOvr>
+</p:sld>
+</file>
+
+<file path=ppt/slides/slide24.xml><?xml version="1.0" encoding="utf-8"?>
+<p:sld xmlns:a="http://schemas.openxmlformats.org/drawingml/2006/main" xmlns:r="http://schemas.openxmlformats.org/officeDocument/2006/relationships" xmlns:mc="http://schemas.openxmlformats.org/markup-compatibility/2006" xmlns:mv="urn:schemas-microsoft-com:mac:vml" xmlns:p="http://schemas.openxmlformats.org/presentationml/2006/main" xmlns:c="http://schemas.openxmlformats.org/drawingml/2006/chart" xmlns:dgm="http://schemas.openxmlformats.org/drawingml/2006/diagram" xmlns:o="urn:schemas-microsoft-com:office:office" xmlns:v="urn:schemas-microsoft-com:vml" xmlns:pvml="urn:schemas-microsoft-com:office:powerpoint" xmlns:com="http://schemas.openxmlformats.org/drawingml/2006/compatibility" xmlns:p14="http://schemas.microsoft.com/office/powerpoint/2010/main" xmlns:p15="http://schemas.microsoft.com/office/powerpoint/2012/main" xmlns:ahyp="http://schemas.microsoft.com/office/drawing/2018/hyperlinkcolor">
+  <p:cSld>
+    <p:spTree>
+      <p:nvGrpSpPr>
+        <p:cNvPr id="194" name="Shape 194"/>
+        <p:cNvGrpSpPr/>
+        <p:nvPr/>
+      </p:nvGrpSpPr>
+      <p:grpSpPr>
+        <a:xfrm>
+          <a:off x="0" y="0"/>
+          <a:ext cx="0" cy="0"/>
+          <a:chOff x="0" y="0"/>
+          <a:chExt cx="0" cy="0"/>
+        </a:xfrm>
+      </p:grpSpPr>
+      <p:sp>
+        <p:nvSpPr>
+          <p:cNvPr id="195" name="Google Shape;195;p37"/>
+          <p:cNvSpPr txBox="1"/>
+          <p:nvPr>
+            <p:ph type="title"/>
+          </p:nvPr>
+        </p:nvSpPr>
+        <p:spPr>
+          <a:xfrm>
+            <a:off x="609600" y="1028700"/>
+            <a:ext cx="8229600" cy="571500"/>
+          </a:xfrm>
+          <a:prstGeom prst="rect">
+            <a:avLst/>
+          </a:prstGeom>
+        </p:spPr>
+        <p:txBody>
+          <a:bodyPr anchorCtr="0" anchor="t" bIns="45700" lIns="91425" spcFirstLastPara="1" rIns="91425" wrap="square" tIns="45700">
+            <a:noAutofit/>
+          </a:bodyPr>
+          <a:lstStyle/>
+          <a:p>
+            <a:pPr indent="0" lvl="0" marL="0" rtl="0" algn="l">
+              <a:spcBef>
+                <a:spcPts val="0"/>
+              </a:spcBef>
+              <a:spcAft>
+                <a:spcPts val="0"/>
+              </a:spcAft>
+              <a:buNone/>
+            </a:pPr>
+            <a:r>
+              <a:rPr lang="en-GB"/>
+              <a:t>File Processing</a:t>
+            </a:r>
+            <a:endParaRPr/>
+          </a:p>
+        </p:txBody>
+      </p:sp>
+      <p:sp>
+        <p:nvSpPr>
+          <p:cNvPr id="196" name="Google Shape;196;p37"/>
+          <p:cNvSpPr txBox="1"/>
+          <p:nvPr>
+            <p:ph idx="1" type="body"/>
+          </p:nvPr>
+        </p:nvSpPr>
+        <p:spPr>
+          <a:xfrm>
+            <a:off x="609600" y="1771650"/>
+            <a:ext cx="8229600" cy="2800200"/>
+          </a:xfrm>
+          <a:prstGeom prst="rect">
+            <a:avLst/>
+          </a:prstGeom>
+        </p:spPr>
+        <p:txBody>
+          <a:bodyPr anchorCtr="0" anchor="t" bIns="45700" lIns="91425" spcFirstLastPara="1" rIns="91425" wrap="square" tIns="45700">
+            <a:noAutofit/>
+          </a:bodyPr>
+          <a:lstStyle/>
+          <a:p>
+            <a:pPr indent="0" lvl="0" marL="0" rtl="0" algn="l">
+              <a:spcBef>
+                <a:spcPts val="540"/>
+              </a:spcBef>
+              <a:spcAft>
+                <a:spcPts val="0"/>
+              </a:spcAft>
+              <a:buNone/>
+            </a:pPr>
+            <a:r>
+              <a:t/>
+            </a:r>
+            <a:endParaRPr/>
+          </a:p>
+        </p:txBody>
+      </p:sp>
+    </p:spTree>
+  </p:cSld>
+  <p:clrMapOvr>
+    <a:masterClrMapping/>
+  </p:clrMapOvr>
+</p:sld>
+</file>
+
+<file path=ppt/slides/slide25.xml><?xml version="1.0" encoding="utf-8"?>
+<p:sld xmlns:a="http://schemas.openxmlformats.org/drawingml/2006/main" xmlns:r="http://schemas.openxmlformats.org/officeDocument/2006/relationships" xmlns:mc="http://schemas.openxmlformats.org/markup-compatibility/2006" xmlns:mv="urn:schemas-microsoft-com:mac:vml" xmlns:p="http://schemas.openxmlformats.org/presentationml/2006/main" xmlns:c="http://schemas.openxmlformats.org/drawingml/2006/chart" xmlns:dgm="http://schemas.openxmlformats.org/drawingml/2006/diagram" xmlns:o="urn:schemas-microsoft-com:office:office" xmlns:v="urn:schemas-microsoft-com:vml" xmlns:pvml="urn:schemas-microsoft-com:office:powerpoint" xmlns:com="http://schemas.openxmlformats.org/drawingml/2006/compatibility" xmlns:p14="http://schemas.microsoft.com/office/powerpoint/2010/main" xmlns:p15="http://schemas.microsoft.com/office/powerpoint/2012/main" xmlns:ahyp="http://schemas.microsoft.com/office/drawing/2018/hyperlinkcolor">
+  <p:cSld>
+    <p:spTree>
+      <p:nvGrpSpPr>
+        <p:cNvPr id="200" name="Shape 200"/>
+        <p:cNvGrpSpPr/>
+        <p:nvPr/>
+      </p:nvGrpSpPr>
+      <p:grpSpPr>
+        <a:xfrm>
+          <a:off x="0" y="0"/>
+          <a:ext cx="0" cy="0"/>
+          <a:chOff x="0" y="0"/>
+          <a:chExt cx="0" cy="0"/>
+        </a:xfrm>
+      </p:grpSpPr>
+      <p:sp>
+        <p:nvSpPr>
+          <p:cNvPr id="201" name="Google Shape;201;p38"/>
+          <p:cNvSpPr txBox="1"/>
+          <p:nvPr>
+            <p:ph type="title"/>
+          </p:nvPr>
+        </p:nvSpPr>
+        <p:spPr>
+          <a:xfrm>
+            <a:off x="1998625" y="183175"/>
+            <a:ext cx="8229600" cy="571500"/>
+          </a:xfrm>
+          <a:prstGeom prst="rect">
+            <a:avLst/>
+          </a:prstGeom>
+        </p:spPr>
+        <p:txBody>
+          <a:bodyPr anchorCtr="0" anchor="t" bIns="45700" lIns="91425" spcFirstLastPara="1" rIns="91425" wrap="square" tIns="45700">
+            <a:noAutofit/>
+          </a:bodyPr>
+          <a:lstStyle/>
+          <a:p>
+            <a:pPr indent="0" lvl="0" marL="0" rtl="0" algn="l">
+              <a:spcBef>
+                <a:spcPts val="0"/>
+              </a:spcBef>
+              <a:spcAft>
+                <a:spcPts val="0"/>
+              </a:spcAft>
+              <a:buNone/>
+            </a:pPr>
+            <a:r>
+              <a:rPr lang="en-GB"/>
+              <a:t>Demonstration</a:t>
+            </a:r>
+            <a:endParaRPr/>
+          </a:p>
+        </p:txBody>
+      </p:sp>
+      <p:sp>
+        <p:nvSpPr>
+          <p:cNvPr id="202" name="Google Shape;202;p38"/>
+          <p:cNvSpPr txBox="1"/>
+          <p:nvPr>
+            <p:ph idx="1" type="body"/>
+          </p:nvPr>
+        </p:nvSpPr>
+        <p:spPr>
+          <a:xfrm>
+            <a:off x="609600" y="1771650"/>
+            <a:ext cx="8229600" cy="2800200"/>
+          </a:xfrm>
+          <a:prstGeom prst="rect">
+            <a:avLst/>
+          </a:prstGeom>
+        </p:spPr>
+        <p:txBody>
+          <a:bodyPr anchorCtr="0" anchor="t" bIns="45700" lIns="91425" spcFirstLastPara="1" rIns="91425" wrap="square" tIns="45700">
+            <a:noAutofit/>
+          </a:bodyPr>
+          <a:lstStyle/>
+          <a:p>
+            <a:pPr indent="0" lvl="0" marL="0" rtl="0" algn="l">
+              <a:lnSpc>
+                <a:spcPct val="90000"/>
+              </a:lnSpc>
+              <a:spcBef>
+                <a:spcPts val="600"/>
+              </a:spcBef>
+              <a:spcAft>
+                <a:spcPts val="0"/>
+              </a:spcAft>
+              <a:buNone/>
+            </a:pPr>
+            <a:r>
+              <a:rPr lang="en-GB" sz="2400">
+                <a:solidFill>
+                  <a:srgbClr val="000000"/>
+                </a:solidFill>
+              </a:rPr>
+              <a:t>•</a:t>
+            </a:r>
+            <a:r>
+              <a:rPr lang="en-GB" sz="1800">
+                <a:solidFill>
+                  <a:srgbClr val="000099"/>
+                </a:solidFill>
+              </a:rPr>
+              <a:t>Method for solving 1</a:t>
+            </a:r>
+            <a:r>
+              <a:rPr baseline="30000" lang="en-GB" sz="1800">
+                <a:solidFill>
+                  <a:srgbClr val="000099"/>
+                </a:solidFill>
+              </a:rPr>
+              <a:t>st</a:t>
+            </a:r>
+            <a:r>
+              <a:rPr lang="en-GB" sz="1800">
+                <a:solidFill>
+                  <a:srgbClr val="000099"/>
+                </a:solidFill>
+              </a:rPr>
+              <a:t> order ODEs with well defined BC’s</a:t>
+            </a:r>
+            <a:endParaRPr sz="1800">
+              <a:solidFill>
+                <a:srgbClr val="000099"/>
+              </a:solidFill>
+            </a:endParaRPr>
+          </a:p>
+          <a:p>
+            <a:pPr indent="0" lvl="0" marL="0" rtl="0" algn="l">
+              <a:lnSpc>
+                <a:spcPct val="90000"/>
+              </a:lnSpc>
+              <a:spcBef>
+                <a:spcPts val="600"/>
+              </a:spcBef>
+              <a:spcAft>
+                <a:spcPts val="0"/>
+              </a:spcAft>
+              <a:buNone/>
+            </a:pPr>
+            <a:r>
+              <a:rPr lang="en-GB" sz="1800">
+                <a:solidFill>
+                  <a:srgbClr val="000000"/>
+                </a:solidFill>
+              </a:rPr>
+              <a:t>•</a:t>
+            </a:r>
+            <a:r>
+              <a:rPr lang="en-GB" sz="1800">
+                <a:solidFill>
+                  <a:srgbClr val="000099"/>
+                </a:solidFill>
+              </a:rPr>
+              <a:t>Shooting Method</a:t>
+            </a:r>
+            <a:endParaRPr sz="1800">
+              <a:solidFill>
+                <a:srgbClr val="000099"/>
+              </a:solidFill>
+            </a:endParaRPr>
+          </a:p>
+          <a:p>
+            <a:pPr indent="0" lvl="0" marL="0" rtl="0" algn="l">
+              <a:lnSpc>
+                <a:spcPct val="90000"/>
+              </a:lnSpc>
+              <a:spcBef>
+                <a:spcPts val="600"/>
+              </a:spcBef>
+              <a:spcAft>
+                <a:spcPts val="0"/>
+              </a:spcAft>
+              <a:buNone/>
+            </a:pPr>
+            <a:r>
+              <a:rPr lang="en-GB" sz="1800">
+                <a:solidFill>
+                  <a:srgbClr val="000000"/>
+                </a:solidFill>
+              </a:rPr>
+              <a:t>–</a:t>
+            </a:r>
+            <a:r>
+              <a:rPr lang="en-GB" sz="1800">
+                <a:solidFill>
+                  <a:srgbClr val="000099"/>
+                </a:solidFill>
+              </a:rPr>
+              <a:t>Compile and run the code</a:t>
+            </a:r>
+            <a:endParaRPr sz="1800">
+              <a:solidFill>
+                <a:srgbClr val="000099"/>
+              </a:solidFill>
+            </a:endParaRPr>
+          </a:p>
+          <a:p>
+            <a:pPr indent="0" lvl="0" marL="0" rtl="0" algn="l">
+              <a:lnSpc>
+                <a:spcPct val="90000"/>
+              </a:lnSpc>
+              <a:spcBef>
+                <a:spcPts val="600"/>
+              </a:spcBef>
+              <a:spcAft>
+                <a:spcPts val="0"/>
+              </a:spcAft>
+              <a:buNone/>
+            </a:pPr>
+            <a:r>
+              <a:rPr lang="en-GB" sz="1800">
+                <a:solidFill>
+                  <a:srgbClr val="000000"/>
+                </a:solidFill>
+              </a:rPr>
+              <a:t>–</a:t>
+            </a:r>
+            <a:r>
+              <a:rPr lang="en-GB" sz="1800">
+                <a:solidFill>
+                  <a:srgbClr val="000099"/>
+                </a:solidFill>
+              </a:rPr>
+              <a:t>startshooting.c</a:t>
+            </a:r>
+            <a:endParaRPr sz="1800">
+              <a:solidFill>
+                <a:srgbClr val="000099"/>
+              </a:solidFill>
+            </a:endParaRPr>
+          </a:p>
+          <a:p>
+            <a:pPr indent="0" lvl="0" marL="0" rtl="0" algn="l">
+              <a:lnSpc>
+                <a:spcPct val="90000"/>
+              </a:lnSpc>
+              <a:spcBef>
+                <a:spcPts val="600"/>
+              </a:spcBef>
+              <a:spcAft>
+                <a:spcPts val="0"/>
+              </a:spcAft>
+              <a:buNone/>
+            </a:pPr>
+            <a:r>
+              <a:rPr lang="en-GB" sz="1800">
+                <a:solidFill>
+                  <a:srgbClr val="000000"/>
+                </a:solidFill>
+              </a:rPr>
+              <a:t>•</a:t>
+            </a:r>
+            <a:r>
+              <a:rPr lang="en-GB" sz="1800">
+                <a:solidFill>
+                  <a:srgbClr val="000099"/>
+                </a:solidFill>
+              </a:rPr>
+              <a:t>Method for solving 1</a:t>
+            </a:r>
+            <a:r>
+              <a:rPr baseline="30000" lang="en-GB" sz="1800">
+                <a:solidFill>
+                  <a:srgbClr val="000099"/>
+                </a:solidFill>
+              </a:rPr>
+              <a:t>st</a:t>
+            </a:r>
+            <a:r>
+              <a:rPr lang="en-GB" sz="1800">
+                <a:solidFill>
+                  <a:srgbClr val="000099"/>
+                </a:solidFill>
+              </a:rPr>
+              <a:t> order ODEs with well defined BC’s</a:t>
+            </a:r>
+            <a:endParaRPr sz="1800">
+              <a:solidFill>
+                <a:srgbClr val="000099"/>
+              </a:solidFill>
+            </a:endParaRPr>
+          </a:p>
+          <a:p>
+            <a:pPr indent="0" lvl="0" marL="0" rtl="0" algn="l">
+              <a:lnSpc>
+                <a:spcPct val="90000"/>
+              </a:lnSpc>
+              <a:spcBef>
+                <a:spcPts val="600"/>
+              </a:spcBef>
+              <a:spcAft>
+                <a:spcPts val="0"/>
+              </a:spcAft>
+              <a:buNone/>
+            </a:pPr>
+            <a:r>
+              <a:rPr lang="en-GB" sz="1800">
+                <a:solidFill>
+                  <a:srgbClr val="000000"/>
+                </a:solidFill>
+              </a:rPr>
+              <a:t>•</a:t>
+            </a:r>
+            <a:r>
+              <a:rPr lang="en-GB" sz="1800">
+                <a:solidFill>
+                  <a:srgbClr val="000099"/>
+                </a:solidFill>
+              </a:rPr>
+              <a:t>Shooting Method</a:t>
+            </a:r>
+            <a:endParaRPr sz="1800">
+              <a:solidFill>
+                <a:srgbClr val="000099"/>
+              </a:solidFill>
+            </a:endParaRPr>
+          </a:p>
+          <a:p>
+            <a:pPr indent="0" lvl="0" marL="0" rtl="0" algn="l">
+              <a:lnSpc>
+                <a:spcPct val="90000"/>
+              </a:lnSpc>
+              <a:spcBef>
+                <a:spcPts val="600"/>
+              </a:spcBef>
+              <a:spcAft>
+                <a:spcPts val="0"/>
+              </a:spcAft>
+              <a:buNone/>
+            </a:pPr>
+            <a:r>
+              <a:rPr lang="en-GB" sz="1800">
+                <a:solidFill>
+                  <a:srgbClr val="000000"/>
+                </a:solidFill>
+              </a:rPr>
+              <a:t>–</a:t>
+            </a:r>
+            <a:r>
+              <a:rPr lang="en-GB" sz="1800">
+                <a:solidFill>
+                  <a:srgbClr val="000099"/>
+                </a:solidFill>
+              </a:rPr>
+              <a:t>Compile and run the code</a:t>
+            </a:r>
+            <a:endParaRPr sz="1800">
+              <a:solidFill>
+                <a:srgbClr val="000099"/>
+              </a:solidFill>
+            </a:endParaRPr>
+          </a:p>
+          <a:p>
+            <a:pPr indent="0" lvl="0" marL="0" rtl="0" algn="l">
+              <a:lnSpc>
+                <a:spcPct val="90000"/>
+              </a:lnSpc>
+              <a:spcBef>
+                <a:spcPts val="600"/>
+              </a:spcBef>
+              <a:spcAft>
+                <a:spcPts val="0"/>
+              </a:spcAft>
+              <a:buNone/>
+            </a:pPr>
+            <a:r>
+              <a:rPr lang="en-GB" sz="1800">
+                <a:solidFill>
+                  <a:srgbClr val="000000"/>
+                </a:solidFill>
+              </a:rPr>
+              <a:t>–</a:t>
+            </a:r>
+            <a:r>
+              <a:rPr lang="en-GB" sz="1800">
+                <a:solidFill>
+                  <a:srgbClr val="000099"/>
+                </a:solidFill>
+              </a:rPr>
+              <a:t>startshooting.c</a:t>
+            </a:r>
+            <a:endParaRPr sz="1800">
+              <a:solidFill>
+                <a:srgbClr val="000099"/>
+              </a:solidFill>
+            </a:endParaRPr>
+          </a:p>
+          <a:p>
+            <a:pPr indent="0" lvl="0" marL="0" rtl="0" algn="l">
+              <a:spcBef>
+                <a:spcPts val="540"/>
+              </a:spcBef>
+              <a:spcAft>
+                <a:spcPts val="0"/>
+              </a:spcAft>
+              <a:buNone/>
+            </a:pPr>
+            <a:r>
+              <a:t/>
+            </a:r>
+            <a:endParaRPr/>
+          </a:p>
+        </p:txBody>
+      </p:sp>
+    </p:spTree>
+  </p:cSld>
+  <p:clrMapOvr>
+    <a:masterClrMapping/>
+  </p:clrMapOvr>
+</p:sld>
+</file>
+
+<file path=ppt/slides/slide26.xml><?xml version="1.0" encoding="utf-8"?>
+<p:sld xmlns:a="http://schemas.openxmlformats.org/drawingml/2006/main" xmlns:r="http://schemas.openxmlformats.org/officeDocument/2006/relationships" xmlns:mc="http://schemas.openxmlformats.org/markup-compatibility/2006" xmlns:mv="urn:schemas-microsoft-com:mac:vml" xmlns:p="http://schemas.openxmlformats.org/presentationml/2006/main" xmlns:c="http://schemas.openxmlformats.org/drawingml/2006/chart" xmlns:dgm="http://schemas.openxmlformats.org/drawingml/2006/diagram" xmlns:o="urn:schemas-microsoft-com:office:office" xmlns:v="urn:schemas-microsoft-com:vml" xmlns:pvml="urn:schemas-microsoft-com:office:powerpoint" xmlns:com="http://schemas.openxmlformats.org/drawingml/2006/compatibility" xmlns:p14="http://schemas.microsoft.com/office/powerpoint/2010/main" xmlns:p15="http://schemas.microsoft.com/office/powerpoint/2012/main" xmlns:ahyp="http://schemas.microsoft.com/office/drawing/2018/hyperlinkcolor">
+  <p:cSld>
+    <p:spTree>
+      <p:nvGrpSpPr>
+        <p:cNvPr id="206" name="Shape 206"/>
+        <p:cNvGrpSpPr/>
+        <p:nvPr/>
+      </p:nvGrpSpPr>
+      <p:grpSpPr>
+        <a:xfrm>
+          <a:off x="0" y="0"/>
+          <a:ext cx="0" cy="0"/>
+          <a:chOff x="0" y="0"/>
+          <a:chExt cx="0" cy="0"/>
+        </a:xfrm>
+      </p:grpSpPr>
+      <p:sp>
+        <p:nvSpPr>
+          <p:cNvPr id="207" name="Google Shape;207;p39"/>
+          <p:cNvSpPr txBox="1"/>
+          <p:nvPr>
+            <p:ph type="title"/>
+          </p:nvPr>
+        </p:nvSpPr>
+        <p:spPr>
+          <a:xfrm>
+            <a:off x="2079175" y="183200"/>
+            <a:ext cx="8229600" cy="571500"/>
+          </a:xfrm>
+          <a:prstGeom prst="rect">
+            <a:avLst/>
+          </a:prstGeom>
+        </p:spPr>
+        <p:txBody>
+          <a:bodyPr anchorCtr="0" anchor="t" bIns="45700" lIns="91425" spcFirstLastPara="1" rIns="91425" wrap="square" tIns="45700">
+            <a:noAutofit/>
+          </a:bodyPr>
+          <a:lstStyle/>
+          <a:p>
+            <a:pPr indent="0" lvl="0" marL="0" rtl="0" algn="l">
+              <a:spcBef>
+                <a:spcPts val="0"/>
+              </a:spcBef>
+              <a:spcAft>
+                <a:spcPts val="0"/>
+              </a:spcAft>
+              <a:buNone/>
+            </a:pPr>
+            <a:r>
+              <a:rPr lang="en-GB"/>
+              <a:t>Exercise</a:t>
+            </a:r>
+            <a:endParaRPr/>
+          </a:p>
+        </p:txBody>
+      </p:sp>
+      <p:sp>
+        <p:nvSpPr>
+          <p:cNvPr id="208" name="Google Shape;208;p39"/>
+          <p:cNvSpPr txBox="1"/>
+          <p:nvPr>
+            <p:ph idx="1" type="body"/>
+          </p:nvPr>
+        </p:nvSpPr>
+        <p:spPr>
+          <a:xfrm>
+            <a:off x="569325" y="1056975"/>
+            <a:ext cx="8229600" cy="2800200"/>
+          </a:xfrm>
+          <a:prstGeom prst="rect">
+            <a:avLst/>
+          </a:prstGeom>
+        </p:spPr>
+        <p:txBody>
+          <a:bodyPr anchorCtr="0" anchor="t" bIns="45700" lIns="91425" spcFirstLastPara="1" rIns="91425" wrap="square" tIns="45700">
+            <a:noAutofit/>
+          </a:bodyPr>
+          <a:lstStyle/>
+          <a:p>
+            <a:pPr indent="-355600" lvl="0" marL="457200" rtl="0" algn="l">
+              <a:lnSpc>
+                <a:spcPct val="90000"/>
+              </a:lnSpc>
+              <a:spcBef>
+                <a:spcPts val="500"/>
+              </a:spcBef>
+              <a:spcAft>
+                <a:spcPts val="0"/>
+              </a:spcAft>
+              <a:buSzPts val="2000"/>
+              <a:buChar char="•"/>
+            </a:pPr>
+            <a:r>
+              <a:rPr lang="en-GB" sz="2000">
+                <a:solidFill>
+                  <a:srgbClr val="000099"/>
+                </a:solidFill>
+              </a:rPr>
+              <a:t>Adapt the program startshooting.c to read the input parameters from an input file.</a:t>
+            </a:r>
+            <a:endParaRPr sz="2000">
+              <a:solidFill>
+                <a:srgbClr val="000099"/>
+              </a:solidFill>
+            </a:endParaRPr>
+          </a:p>
+          <a:p>
+            <a:pPr indent="-355600" lvl="0" marL="457200" rtl="0" algn="l">
+              <a:lnSpc>
+                <a:spcPct val="90000"/>
+              </a:lnSpc>
+              <a:spcBef>
+                <a:spcPts val="0"/>
+              </a:spcBef>
+              <a:spcAft>
+                <a:spcPts val="0"/>
+              </a:spcAft>
+              <a:buSzPts val="2000"/>
+              <a:buChar char="•"/>
+            </a:pPr>
+            <a:r>
+              <a:rPr lang="en-GB" sz="2000">
+                <a:solidFill>
+                  <a:srgbClr val="000099"/>
+                </a:solidFill>
+              </a:rPr>
+              <a:t>Adapt the program so that it reads the guess q froom the command line</a:t>
+            </a:r>
+            <a:endParaRPr sz="2000">
+              <a:solidFill>
+                <a:srgbClr val="000099"/>
+              </a:solidFill>
+            </a:endParaRPr>
+          </a:p>
+          <a:p>
+            <a:pPr indent="-355600" lvl="0" marL="457200" rtl="0" algn="l">
+              <a:lnSpc>
+                <a:spcPct val="90000"/>
+              </a:lnSpc>
+              <a:spcBef>
+                <a:spcPts val="0"/>
+              </a:spcBef>
+              <a:spcAft>
+                <a:spcPts val="0"/>
+              </a:spcAft>
+              <a:buSzPts val="2000"/>
+              <a:buChar char="•"/>
+            </a:pPr>
+            <a:r>
+              <a:rPr lang="en-GB" sz="2000">
+                <a:solidFill>
+                  <a:srgbClr val="000099"/>
+                </a:solidFill>
+              </a:rPr>
+              <a:t>To read parameters from the command line we use the parameters argc and argv passed into the main function</a:t>
+            </a:r>
+            <a:endParaRPr sz="2000">
+              <a:solidFill>
+                <a:srgbClr val="000099"/>
+              </a:solidFill>
+            </a:endParaRPr>
+          </a:p>
+          <a:p>
+            <a:pPr indent="-355600" lvl="0" marL="457200" rtl="0" algn="l">
+              <a:lnSpc>
+                <a:spcPct val="90000"/>
+              </a:lnSpc>
+              <a:spcBef>
+                <a:spcPts val="0"/>
+              </a:spcBef>
+              <a:spcAft>
+                <a:spcPts val="0"/>
+              </a:spcAft>
+              <a:buSzPts val="2000"/>
+              <a:buChar char="•"/>
+            </a:pPr>
+            <a:r>
+              <a:rPr lang="en-GB" sz="2000">
+                <a:solidFill>
+                  <a:srgbClr val="000099"/>
+                </a:solidFill>
+              </a:rPr>
+              <a:t>Use the following line to convert the command line parameter</a:t>
+            </a:r>
+            <a:endParaRPr sz="2000">
+              <a:solidFill>
+                <a:srgbClr val="000099"/>
+              </a:solidFill>
+            </a:endParaRPr>
+          </a:p>
+          <a:p>
+            <a:pPr indent="-330200" lvl="0" marL="457200" rtl="0" algn="l">
+              <a:lnSpc>
+                <a:spcPct val="90000"/>
+              </a:lnSpc>
+              <a:spcBef>
+                <a:spcPts val="0"/>
+              </a:spcBef>
+              <a:spcAft>
+                <a:spcPts val="0"/>
+              </a:spcAft>
+              <a:buSzPts val="1600"/>
+              <a:buChar char="•"/>
+            </a:pPr>
+            <a:r>
+              <a:rPr lang="en-GB" sz="1600">
+                <a:solidFill>
+                  <a:srgbClr val="000099"/>
+                </a:solidFill>
+              </a:rPr>
+              <a:t>Hint look at vecdp.c in the functions folder</a:t>
+            </a:r>
+            <a:endParaRPr sz="1600">
+              <a:solidFill>
+                <a:srgbClr val="000099"/>
+              </a:solidFill>
+            </a:endParaRPr>
+          </a:p>
+          <a:p>
+            <a:pPr indent="0" lvl="0" marL="457200" rtl="0" algn="l">
+              <a:lnSpc>
+                <a:spcPct val="90000"/>
+              </a:lnSpc>
+              <a:spcBef>
+                <a:spcPts val="400"/>
+              </a:spcBef>
+              <a:spcAft>
+                <a:spcPts val="0"/>
+              </a:spcAft>
+              <a:buNone/>
+            </a:pPr>
+            <a:r>
+              <a:rPr lang="en-GB" sz="1600">
+                <a:solidFill>
+                  <a:srgbClr val="6AA84F"/>
+                </a:solidFill>
+              </a:rPr>
+              <a:t>If(argc&gt;1)</a:t>
+            </a:r>
+            <a:endParaRPr sz="1600">
+              <a:solidFill>
+                <a:srgbClr val="6AA84F"/>
+              </a:solidFill>
+            </a:endParaRPr>
+          </a:p>
+          <a:p>
+            <a:pPr indent="0" lvl="0" marL="342900" rtl="0" algn="l">
+              <a:lnSpc>
+                <a:spcPct val="90000"/>
+              </a:lnSpc>
+              <a:spcBef>
+                <a:spcPts val="500"/>
+              </a:spcBef>
+              <a:spcAft>
+                <a:spcPts val="0"/>
+              </a:spcAft>
+              <a:buNone/>
+            </a:pPr>
+            <a:r>
+              <a:rPr lang="en-GB" sz="2000">
+                <a:solidFill>
+                  <a:srgbClr val="6AA84F"/>
+                </a:solidFill>
+              </a:rPr>
+              <a:t>  	</a:t>
+            </a:r>
+            <a:r>
+              <a:rPr lang="en-GB" sz="1600">
+                <a:solidFill>
+                  <a:srgbClr val="6AA84F"/>
+                </a:solidFill>
+              </a:rPr>
+              <a:t>q=atof(argv[1]);</a:t>
+            </a:r>
+            <a:endParaRPr sz="1600">
+              <a:solidFill>
+                <a:srgbClr val="6AA84F"/>
+              </a:solidFill>
+            </a:endParaRPr>
+          </a:p>
+          <a:p>
+            <a:pPr indent="0" lvl="0" marL="0" rtl="0" algn="l">
+              <a:spcBef>
+                <a:spcPts val="540"/>
+              </a:spcBef>
+              <a:spcAft>
+                <a:spcPts val="0"/>
+              </a:spcAft>
+              <a:buNone/>
+            </a:pPr>
+            <a:r>
+              <a:t/>
+            </a:r>
+            <a:endParaRPr/>
+          </a:p>
+        </p:txBody>
+      </p:sp>
+    </p:spTree>
+  </p:cSld>
+  <p:clrMapOvr>
+    <a:masterClrMapping/>
+  </p:clrMapOvr>
+</p:sld>
+</file>
+
+<file path=ppt/slides/slide27.xml><?xml version="1.0" encoding="utf-8"?>
+<p:sld xmlns:a="http://schemas.openxmlformats.org/drawingml/2006/main" xmlns:r="http://schemas.openxmlformats.org/officeDocument/2006/relationships" xmlns:mc="http://schemas.openxmlformats.org/markup-compatibility/2006" xmlns:mv="urn:schemas-microsoft-com:mac:vml" xmlns:p="http://schemas.openxmlformats.org/presentationml/2006/main" xmlns:c="http://schemas.openxmlformats.org/drawingml/2006/chart" xmlns:dgm="http://schemas.openxmlformats.org/drawingml/2006/diagram" xmlns:o="urn:schemas-microsoft-com:office:office" xmlns:v="urn:schemas-microsoft-com:vml" xmlns:pvml="urn:schemas-microsoft-com:office:powerpoint" xmlns:com="http://schemas.openxmlformats.org/drawingml/2006/compatibility" xmlns:p14="http://schemas.microsoft.com/office/powerpoint/2010/main" xmlns:p15="http://schemas.microsoft.com/office/powerpoint/2012/main" xmlns:ahyp="http://schemas.microsoft.com/office/drawing/2018/hyperlinkcolor">
+  <p:cSld>
+    <p:spTree>
+      <p:nvGrpSpPr>
+        <p:cNvPr id="212" name="Shape 212"/>
+        <p:cNvGrpSpPr/>
+        <p:nvPr/>
+      </p:nvGrpSpPr>
+      <p:grpSpPr>
+        <a:xfrm>
+          <a:off x="0" y="0"/>
+          <a:ext cx="0" cy="0"/>
+          <a:chOff x="0" y="0"/>
+          <a:chExt cx="0" cy="0"/>
+        </a:xfrm>
+      </p:grpSpPr>
+      <p:sp>
+        <p:nvSpPr>
+          <p:cNvPr id="213" name="Google Shape;213;p40"/>
+          <p:cNvSpPr txBox="1"/>
+          <p:nvPr>
+            <p:ph type="title"/>
+          </p:nvPr>
+        </p:nvSpPr>
+        <p:spPr>
+          <a:xfrm>
+            <a:off x="609600" y="1028700"/>
+            <a:ext cx="8229600" cy="571500"/>
+          </a:xfrm>
+          <a:prstGeom prst="rect">
+            <a:avLst/>
+          </a:prstGeom>
+        </p:spPr>
+        <p:txBody>
+          <a:bodyPr anchorCtr="0" anchor="t" bIns="45700" lIns="91425" spcFirstLastPara="1" rIns="91425" wrap="square" tIns="45700">
+            <a:noAutofit/>
+          </a:bodyPr>
+          <a:lstStyle/>
+          <a:p>
+            <a:pPr indent="0" lvl="0" marL="0" rtl="0" algn="l">
+              <a:spcBef>
+                <a:spcPts val="0"/>
+              </a:spcBef>
+              <a:spcAft>
+                <a:spcPts val="0"/>
+              </a:spcAft>
+              <a:buNone/>
+            </a:pPr>
+            <a:r>
+              <a:rPr lang="en-GB"/>
+              <a:t>Random Access Files</a:t>
+            </a:r>
+            <a:endParaRPr/>
+          </a:p>
+        </p:txBody>
+      </p:sp>
+      <p:sp>
+        <p:nvSpPr>
+          <p:cNvPr id="214" name="Google Shape;214;p40"/>
+          <p:cNvSpPr txBox="1"/>
+          <p:nvPr>
+            <p:ph idx="1" type="body"/>
+          </p:nvPr>
+        </p:nvSpPr>
+        <p:spPr>
+          <a:xfrm>
+            <a:off x="609600" y="1771650"/>
+            <a:ext cx="8229600" cy="2800200"/>
+          </a:xfrm>
+          <a:prstGeom prst="rect">
+            <a:avLst/>
+          </a:prstGeom>
+        </p:spPr>
+        <p:txBody>
+          <a:bodyPr anchorCtr="0" anchor="t" bIns="45700" lIns="91425" spcFirstLastPara="1" rIns="91425" wrap="square" tIns="45700">
+            <a:noAutofit/>
+          </a:bodyPr>
+          <a:lstStyle/>
+          <a:p>
+            <a:pPr indent="0" lvl="0" marL="0" rtl="0" algn="l">
+              <a:spcBef>
+                <a:spcPts val="540"/>
+              </a:spcBef>
+              <a:spcAft>
+                <a:spcPts val="0"/>
+              </a:spcAft>
+              <a:buNone/>
+            </a:pPr>
+            <a:r>
+              <a:t/>
+            </a:r>
+            <a:endParaRPr/>
+          </a:p>
+        </p:txBody>
+      </p:sp>
+    </p:spTree>
+  </p:cSld>
+  <p:clrMapOvr>
+    <a:masterClrMapping/>
+  </p:clrMapOvr>
+</p:sld>
+</file>
+
+<file path=ppt/slides/slide28.xml><?xml version="1.0" encoding="utf-8"?>
+<p:sld xmlns:a="http://schemas.openxmlformats.org/drawingml/2006/main" xmlns:r="http://schemas.openxmlformats.org/officeDocument/2006/relationships" xmlns:mc="http://schemas.openxmlformats.org/markup-compatibility/2006" xmlns:mv="urn:schemas-microsoft-com:mac:vml" xmlns:p="http://schemas.openxmlformats.org/presentationml/2006/main" xmlns:c="http://schemas.openxmlformats.org/drawingml/2006/chart" xmlns:dgm="http://schemas.openxmlformats.org/drawingml/2006/diagram" xmlns:o="urn:schemas-microsoft-com:office:office" xmlns:v="urn:schemas-microsoft-com:vml" xmlns:pvml="urn:schemas-microsoft-com:office:powerpoint" xmlns:com="http://schemas.openxmlformats.org/drawingml/2006/compatibility" xmlns:p14="http://schemas.microsoft.com/office/powerpoint/2010/main" xmlns:p15="http://schemas.microsoft.com/office/powerpoint/2012/main" xmlns:ahyp="http://schemas.microsoft.com/office/drawing/2018/hyperlinkcolor">
+  <p:cSld>
+    <p:spTree>
+      <p:nvGrpSpPr>
+        <p:cNvPr id="218" name="Shape 218"/>
+        <p:cNvGrpSpPr/>
+        <p:nvPr/>
+      </p:nvGrpSpPr>
+      <p:grpSpPr>
+        <a:xfrm>
+          <a:off x="0" y="0"/>
+          <a:ext cx="0" cy="0"/>
+          <a:chOff x="0" y="0"/>
+          <a:chExt cx="0" cy="0"/>
+        </a:xfrm>
+      </p:grpSpPr>
+      <p:sp>
+        <p:nvSpPr>
+          <p:cNvPr id="219" name="Google Shape;219;p41"/>
+          <p:cNvSpPr txBox="1"/>
+          <p:nvPr>
+            <p:ph type="title"/>
+          </p:nvPr>
+        </p:nvSpPr>
+        <p:spPr>
+          <a:xfrm>
+            <a:off x="609600" y="1028700"/>
+            <a:ext cx="8229600" cy="571500"/>
+          </a:xfrm>
+          <a:prstGeom prst="rect">
+            <a:avLst/>
+          </a:prstGeom>
+        </p:spPr>
+        <p:txBody>
+          <a:bodyPr anchorCtr="0" anchor="t" bIns="45700" lIns="91425" spcFirstLastPara="1" rIns="91425" wrap="square" tIns="45700">
+            <a:noAutofit/>
+          </a:bodyPr>
+          <a:lstStyle/>
+          <a:p>
+            <a:pPr indent="0" lvl="0" marL="0" rtl="0" algn="l">
+              <a:spcBef>
+                <a:spcPts val="0"/>
+              </a:spcBef>
+              <a:spcAft>
+                <a:spcPts val="0"/>
+              </a:spcAft>
+              <a:buNone/>
+            </a:pPr>
+            <a:r>
+              <a:rPr lang="en-GB"/>
+              <a:t>Practice</a:t>
+            </a:r>
+            <a:endParaRPr/>
+          </a:p>
+        </p:txBody>
+      </p:sp>
+      <p:sp>
+        <p:nvSpPr>
+          <p:cNvPr id="220" name="Google Shape;220;p41"/>
+          <p:cNvSpPr txBox="1"/>
+          <p:nvPr>
+            <p:ph idx="1" type="body"/>
+          </p:nvPr>
+        </p:nvSpPr>
+        <p:spPr>
+          <a:xfrm>
+            <a:off x="609600" y="1771650"/>
+            <a:ext cx="8229600" cy="2800200"/>
+          </a:xfrm>
+          <a:prstGeom prst="rect">
+            <a:avLst/>
+          </a:prstGeom>
+        </p:spPr>
+        <p:txBody>
+          <a:bodyPr anchorCtr="0" anchor="t" bIns="45700" lIns="91425" spcFirstLastPara="1" rIns="91425" wrap="square" tIns="45700">
+            <a:noAutofit/>
+          </a:bodyPr>
+          <a:lstStyle/>
+          <a:p>
+            <a:pPr indent="0" lvl="0" marL="0" rtl="0" algn="l">
+              <a:lnSpc>
+                <a:spcPct val="115000"/>
+              </a:lnSpc>
+              <a:spcBef>
+                <a:spcPts val="600"/>
+              </a:spcBef>
+              <a:spcAft>
+                <a:spcPts val="0"/>
+              </a:spcAft>
+              <a:buNone/>
+            </a:pPr>
+            <a:r>
+              <a:rPr lang="en-GB" sz="2400">
+                <a:solidFill>
+                  <a:srgbClr val="000000"/>
+                </a:solidFill>
+              </a:rPr>
+              <a:t>•</a:t>
+            </a:r>
+            <a:r>
+              <a:rPr lang="en-GB" sz="2400">
+                <a:solidFill>
+                  <a:srgbClr val="000099"/>
+                </a:solidFill>
+              </a:rPr>
+              <a:t>Study and run the program fileio.c in the extras directory </a:t>
+            </a:r>
+            <a:endParaRPr sz="2400">
+              <a:solidFill>
+                <a:srgbClr val="000099"/>
+              </a:solidFill>
+            </a:endParaRPr>
+          </a:p>
+          <a:p>
+            <a:pPr indent="0" lvl="0" marL="0" rtl="0" algn="l">
+              <a:spcBef>
+                <a:spcPts val="540"/>
+              </a:spcBef>
+              <a:spcAft>
+                <a:spcPts val="0"/>
+              </a:spcAft>
+              <a:buNone/>
+            </a:pPr>
+            <a:r>
+              <a:t/>
+            </a:r>
+            <a:endParaRPr/>
           </a:p>
         </p:txBody>
       </p:sp>

</xml_diff>